<commit_message>
Continuazione del PW di presentazione
</commit_message>
<xml_diff>
--- a/DOCUMENTAZIONE/Presentazione GestioneProgetto.pptx
+++ b/DOCUMENTAZIONE/Presentazione GestioneProgetto.pptx
@@ -10,6 +10,8 @@
     <p:sldId id="258" r:id="rId4"/>
     <p:sldId id="259" r:id="rId5"/>
     <p:sldId id="260" r:id="rId6"/>
+    <p:sldId id="261" r:id="rId7"/>
+    <p:sldId id="262" r:id="rId8"/>
   </p:sldIdLst>
   <p:sldSz cx="12192000" cy="6858000"/>
   <p:notesSz cx="6858000" cy="9144000"/>
@@ -8217,7 +8219,7 @@
             <a:fld id="{87DE6118-2437-4B30-8E3C-4D2BE6020583}" type="datetimeFigureOut">
               <a:rPr lang="en-US" dirty="0"/>
               <a:pPr/>
-              <a:t>11/18/2021</a:t>
+              <a:t>11/25/2021</a:t>
             </a:fld>
             <a:endParaRPr lang="en-US" dirty="0"/>
           </a:p>
@@ -8543,7 +8545,7 @@
           <a:p>
             <a:fld id="{87DE6118-2437-4B30-8E3C-4D2BE6020583}" type="datetimeFigureOut">
               <a:rPr lang="en-US" dirty="0"/>
-              <a:t>11/18/2021</a:t>
+              <a:t>11/25/2021</a:t>
             </a:fld>
             <a:endParaRPr lang="en-US" dirty="0"/>
           </a:p>
@@ -8718,7 +8720,7 @@
           <a:p>
             <a:fld id="{87DE6118-2437-4B30-8E3C-4D2BE6020583}" type="datetimeFigureOut">
               <a:rPr lang="en-US" dirty="0"/>
-              <a:t>11/18/2021</a:t>
+              <a:t>11/25/2021</a:t>
             </a:fld>
             <a:endParaRPr lang="en-US" dirty="0"/>
           </a:p>
@@ -8883,7 +8885,7 @@
           <a:p>
             <a:fld id="{87DE6118-2437-4B30-8E3C-4D2BE6020583}" type="datetimeFigureOut">
               <a:rPr lang="en-US" dirty="0"/>
-              <a:t>11/18/2021</a:t>
+              <a:t>11/25/2021</a:t>
             </a:fld>
             <a:endParaRPr lang="en-US" dirty="0"/>
           </a:p>
@@ -9156,7 +9158,7 @@
             <a:fld id="{87DE6118-2437-4B30-8E3C-4D2BE6020583}" type="datetimeFigureOut">
               <a:rPr lang="en-US" dirty="0"/>
               <a:pPr/>
-              <a:t>11/18/2021</a:t>
+              <a:t>11/25/2021</a:t>
             </a:fld>
             <a:endParaRPr lang="en-US" dirty="0"/>
           </a:p>
@@ -9546,7 +9548,7 @@
           <a:p>
             <a:fld id="{87DE6118-2437-4B30-8E3C-4D2BE6020583}" type="datetimeFigureOut">
               <a:rPr lang="en-US" dirty="0"/>
-              <a:t>11/18/2021</a:t>
+              <a:t>11/25/2021</a:t>
             </a:fld>
             <a:endParaRPr lang="en-US" dirty="0"/>
           </a:p>
@@ -10018,7 +10020,7 @@
           <a:p>
             <a:fld id="{87DE6118-2437-4B30-8E3C-4D2BE6020583}" type="datetimeFigureOut">
               <a:rPr lang="en-US" dirty="0"/>
-              <a:t>11/18/2021</a:t>
+              <a:t>11/25/2021</a:t>
             </a:fld>
             <a:endParaRPr lang="en-US" dirty="0"/>
           </a:p>
@@ -10131,7 +10133,7 @@
           <a:p>
             <a:fld id="{87DE6118-2437-4B30-8E3C-4D2BE6020583}" type="datetimeFigureOut">
               <a:rPr lang="en-US" dirty="0"/>
-              <a:t>11/18/2021</a:t>
+              <a:t>11/25/2021</a:t>
             </a:fld>
             <a:endParaRPr lang="en-US" dirty="0"/>
           </a:p>
@@ -10221,7 +10223,7 @@
           <a:p>
             <a:fld id="{87DE6118-2437-4B30-8E3C-4D2BE6020583}" type="datetimeFigureOut">
               <a:rPr lang="en-US" dirty="0"/>
-              <a:t>11/18/2021</a:t>
+              <a:t>11/25/2021</a:t>
             </a:fld>
             <a:endParaRPr lang="en-US" dirty="0"/>
           </a:p>
@@ -10563,7 +10565,7 @@
             <a:fld id="{87DE6118-2437-4B30-8E3C-4D2BE6020583}" type="datetimeFigureOut">
               <a:rPr lang="en-US" dirty="0"/>
               <a:pPr/>
-              <a:t>11/18/2021</a:t>
+              <a:t>11/25/2021</a:t>
             </a:fld>
             <a:endParaRPr lang="en-US" dirty="0"/>
           </a:p>
@@ -10948,7 +10950,7 @@
             <a:fld id="{87DE6118-2437-4B30-8E3C-4D2BE6020583}" type="datetimeFigureOut">
               <a:rPr lang="en-US" dirty="0"/>
               <a:pPr/>
-              <a:t>11/18/2021</a:t>
+              <a:t>11/25/2021</a:t>
             </a:fld>
             <a:endParaRPr lang="en-US" dirty="0"/>
           </a:p>
@@ -11223,7 +11225,7 @@
             <a:fld id="{87DE6118-2437-4B30-8E3C-4D2BE6020583}" type="datetimeFigureOut">
               <a:rPr lang="en-US" dirty="0"/>
               <a:pPr/>
-              <a:t>11/18/2021</a:t>
+              <a:t>11/25/2021</a:t>
             </a:fld>
             <a:endParaRPr lang="en-US" dirty="0"/>
           </a:p>
@@ -13293,6 +13295,262 @@
 </p:sld>
 </file>
 
+<file path=ppt/slides/slide6.xml><?xml version="1.0" encoding="utf-8"?>
+<p:sld xmlns:a="http://schemas.openxmlformats.org/drawingml/2006/main" xmlns:r="http://schemas.openxmlformats.org/officeDocument/2006/relationships" xmlns:p="http://schemas.openxmlformats.org/presentationml/2006/main">
+  <p:cSld>
+    <p:spTree>
+      <p:nvGrpSpPr>
+        <p:cNvPr id="1" name=""/>
+        <p:cNvGrpSpPr/>
+        <p:nvPr/>
+      </p:nvGrpSpPr>
+      <p:grpSpPr>
+        <a:xfrm>
+          <a:off x="0" y="0"/>
+          <a:ext cx="0" cy="0"/>
+          <a:chOff x="0" y="0"/>
+          <a:chExt cx="0" cy="0"/>
+        </a:xfrm>
+      </p:grpSpPr>
+      <p:sp>
+        <p:nvSpPr>
+          <p:cNvPr id="2" name="Titolo 1">
+            <a:extLst>
+              <a:ext uri="{FF2B5EF4-FFF2-40B4-BE49-F238E27FC236}">
+                <a16:creationId xmlns:a16="http://schemas.microsoft.com/office/drawing/2014/main" id="{AF02C70C-9175-42E2-B896-1DA88B88ABD9}"/>
+              </a:ext>
+            </a:extLst>
+          </p:cNvPr>
+          <p:cNvSpPr>
+            <a:spLocks noGrp="1"/>
+          </p:cNvSpPr>
+          <p:nvPr>
+            <p:ph type="title"/>
+          </p:nvPr>
+        </p:nvSpPr>
+        <p:spPr/>
+        <p:txBody>
+          <a:bodyPr/>
+          <a:lstStyle/>
+          <a:p>
+            <a:r>
+              <a:rPr lang="it-IT" dirty="0"/>
+              <a:t>REGISTRA</a:t>
+            </a:r>
+          </a:p>
+        </p:txBody>
+      </p:sp>
+      <p:sp>
+        <p:nvSpPr>
+          <p:cNvPr id="3" name="Segnaposto contenuto 2">
+            <a:extLst>
+              <a:ext uri="{FF2B5EF4-FFF2-40B4-BE49-F238E27FC236}">
+                <a16:creationId xmlns:a16="http://schemas.microsoft.com/office/drawing/2014/main" id="{FE6C68BD-92D9-4E8D-B8A3-F65108CD93B2}"/>
+              </a:ext>
+            </a:extLst>
+          </p:cNvPr>
+          <p:cNvSpPr>
+            <a:spLocks noGrp="1"/>
+          </p:cNvSpPr>
+          <p:nvPr>
+            <p:ph sz="half" idx="1"/>
+          </p:nvPr>
+        </p:nvSpPr>
+        <p:spPr/>
+        <p:txBody>
+          <a:bodyPr/>
+          <a:lstStyle/>
+          <a:p>
+            <a:r>
+              <a:rPr lang="it-IT" dirty="0"/>
+              <a:t>Registrare un pc nel magazzino</a:t>
+            </a:r>
+          </a:p>
+          <a:p>
+            <a:pPr marL="0" indent="0">
+              <a:buNone/>
+            </a:pPr>
+            <a:endParaRPr lang="it-IT" dirty="0"/>
+          </a:p>
+          <a:p>
+            <a:r>
+              <a:rPr lang="it-IT" dirty="0"/>
+              <a:t>Noleggiare un PC (esistente o non) ad un prof </a:t>
+            </a:r>
+          </a:p>
+          <a:p>
+            <a:pPr marL="0" indent="0">
+              <a:buNone/>
+            </a:pPr>
+            <a:endParaRPr lang="it-IT" dirty="0"/>
+          </a:p>
+          <a:p>
+            <a:r>
+              <a:rPr lang="it-IT" dirty="0"/>
+              <a:t>Designare un PC ad un aula</a:t>
+            </a:r>
+          </a:p>
+        </p:txBody>
+      </p:sp>
+      <p:sp>
+        <p:nvSpPr>
+          <p:cNvPr id="4" name="Segnaposto contenuto 3">
+            <a:extLst>
+              <a:ext uri="{FF2B5EF4-FFF2-40B4-BE49-F238E27FC236}">
+                <a16:creationId xmlns:a16="http://schemas.microsoft.com/office/drawing/2014/main" id="{6EAAD5E1-5641-406F-87AD-7D56EC43F8F4}"/>
+              </a:ext>
+            </a:extLst>
+          </p:cNvPr>
+          <p:cNvSpPr>
+            <a:spLocks noGrp="1"/>
+          </p:cNvSpPr>
+          <p:nvPr>
+            <p:ph sz="half" idx="2"/>
+          </p:nvPr>
+        </p:nvSpPr>
+        <p:spPr/>
+        <p:txBody>
+          <a:bodyPr/>
+          <a:lstStyle/>
+          <a:p>
+            <a:pPr marL="0" indent="0">
+              <a:buNone/>
+            </a:pPr>
+            <a:endParaRPr lang="it-IT" dirty="0"/>
+          </a:p>
+        </p:txBody>
+      </p:sp>
+    </p:spTree>
+    <p:extLst>
+      <p:ext uri="{BB962C8B-B14F-4D97-AF65-F5344CB8AC3E}">
+        <p14:creationId xmlns:p14="http://schemas.microsoft.com/office/powerpoint/2010/main" val="1138989625"/>
+      </p:ext>
+    </p:extLst>
+  </p:cSld>
+  <p:clrMapOvr>
+    <a:masterClrMapping/>
+  </p:clrMapOvr>
+</p:sld>
+</file>
+
+<file path=ppt/slides/slide7.xml><?xml version="1.0" encoding="utf-8"?>
+<p:sld xmlns:a="http://schemas.openxmlformats.org/drawingml/2006/main" xmlns:r="http://schemas.openxmlformats.org/officeDocument/2006/relationships" xmlns:p="http://schemas.openxmlformats.org/presentationml/2006/main">
+  <p:cSld>
+    <p:spTree>
+      <p:nvGrpSpPr>
+        <p:cNvPr id="1" name=""/>
+        <p:cNvGrpSpPr/>
+        <p:nvPr/>
+      </p:nvGrpSpPr>
+      <p:grpSpPr>
+        <a:xfrm>
+          <a:off x="0" y="0"/>
+          <a:ext cx="0" cy="0"/>
+          <a:chOff x="0" y="0"/>
+          <a:chExt cx="0" cy="0"/>
+        </a:xfrm>
+      </p:grpSpPr>
+      <p:sp>
+        <p:nvSpPr>
+          <p:cNvPr id="2" name="Titolo 1">
+            <a:extLst>
+              <a:ext uri="{FF2B5EF4-FFF2-40B4-BE49-F238E27FC236}">
+                <a16:creationId xmlns:a16="http://schemas.microsoft.com/office/drawing/2014/main" id="{C4ECA4AF-25D1-40D7-95E6-1577D2CDBEA7}"/>
+              </a:ext>
+            </a:extLst>
+          </p:cNvPr>
+          <p:cNvSpPr>
+            <a:spLocks noGrp="1"/>
+          </p:cNvSpPr>
+          <p:nvPr>
+            <p:ph type="title"/>
+          </p:nvPr>
+        </p:nvSpPr>
+        <p:spPr/>
+        <p:txBody>
+          <a:bodyPr/>
+          <a:lstStyle/>
+          <a:p>
+            <a:r>
+              <a:rPr lang="it-IT" dirty="0"/>
+              <a:t>VISUALIZZA</a:t>
+            </a:r>
+          </a:p>
+        </p:txBody>
+      </p:sp>
+      <p:sp>
+        <p:nvSpPr>
+          <p:cNvPr id="3" name="Segnaposto contenuto 2">
+            <a:extLst>
+              <a:ext uri="{FF2B5EF4-FFF2-40B4-BE49-F238E27FC236}">
+                <a16:creationId xmlns:a16="http://schemas.microsoft.com/office/drawing/2014/main" id="{7EAB21CB-5ECE-47E6-9BBE-0986CE12BCBC}"/>
+              </a:ext>
+            </a:extLst>
+          </p:cNvPr>
+          <p:cNvSpPr>
+            <a:spLocks noGrp="1"/>
+          </p:cNvSpPr>
+          <p:nvPr>
+            <p:ph sz="half" idx="1"/>
+          </p:nvPr>
+        </p:nvSpPr>
+        <p:spPr/>
+        <p:txBody>
+          <a:bodyPr/>
+          <a:lstStyle/>
+          <a:p>
+            <a:pPr marL="0" indent="0">
+              <a:buNone/>
+            </a:pPr>
+            <a:r>
+              <a:rPr lang="it-IT" dirty="0"/>
+              <a:t>In </a:t>
+            </a:r>
+            <a:r>
+              <a:rPr lang="it-IT"/>
+              <a:t>Input inseriremo il bar code </a:t>
+            </a:r>
+          </a:p>
+        </p:txBody>
+      </p:sp>
+      <p:sp>
+        <p:nvSpPr>
+          <p:cNvPr id="4" name="Segnaposto contenuto 3">
+            <a:extLst>
+              <a:ext uri="{FF2B5EF4-FFF2-40B4-BE49-F238E27FC236}">
+                <a16:creationId xmlns:a16="http://schemas.microsoft.com/office/drawing/2014/main" id="{797BB0C5-D566-4833-9E2B-398DD8C81899}"/>
+              </a:ext>
+            </a:extLst>
+          </p:cNvPr>
+          <p:cNvSpPr>
+            <a:spLocks noGrp="1"/>
+          </p:cNvSpPr>
+          <p:nvPr>
+            <p:ph sz="half" idx="2"/>
+          </p:nvPr>
+        </p:nvSpPr>
+        <p:spPr/>
+        <p:txBody>
+          <a:bodyPr/>
+          <a:lstStyle/>
+          <a:p>
+            <a:endParaRPr lang="it-IT"/>
+          </a:p>
+        </p:txBody>
+      </p:sp>
+    </p:spTree>
+    <p:extLst>
+      <p:ext uri="{BB962C8B-B14F-4D97-AF65-F5344CB8AC3E}">
+        <p14:creationId xmlns:p14="http://schemas.microsoft.com/office/powerpoint/2010/main" val="3308964582"/>
+      </p:ext>
+    </p:extLst>
+  </p:cSld>
+  <p:clrMapOvr>
+    <a:masterClrMapping/>
+  </p:clrMapOvr>
+</p:sld>
+</file>
+
 <file path=ppt/theme/theme1.xml><?xml version="1.0" encoding="utf-8"?>
 <a:theme xmlns:a="http://schemas.openxmlformats.org/drawingml/2006/main" name="Ritaglio">
   <a:themeElements>

</xml_diff>

<commit_message>
Ultimazione della presentazione PW
stato della presentazione 98%
stato della  programmazione del software 97%
</commit_message>
<xml_diff>
--- a/DOCUMENTAZIONE/Presentazione GestioneProgetto.pptx
+++ b/DOCUMENTAZIONE/Presentazione GestioneProgetto.pptx
@@ -15,7 +15,10 @@
     <p:sldId id="263" r:id="rId9"/>
     <p:sldId id="267" r:id="rId10"/>
     <p:sldId id="268" r:id="rId11"/>
-    <p:sldId id="266" r:id="rId12"/>
+    <p:sldId id="269" r:id="rId12"/>
+    <p:sldId id="266" r:id="rId13"/>
+    <p:sldId id="270" r:id="rId14"/>
+    <p:sldId id="271" r:id="rId15"/>
   </p:sldIdLst>
   <p:sldSz cx="12192000" cy="6858000"/>
   <p:notesSz cx="6858000" cy="9144000"/>
@@ -8235,7 +8238,7 @@
             <a:fld id="{87DE6118-2437-4B30-8E3C-4D2BE6020583}" type="datetimeFigureOut">
               <a:rPr lang="en-US" dirty="0"/>
               <a:pPr/>
-              <a:t>12/2/2021</a:t>
+              <a:t>12/4/2021</a:t>
             </a:fld>
             <a:endParaRPr lang="en-US" dirty="0"/>
           </a:p>
@@ -8561,7 +8564,7 @@
           <a:p>
             <a:fld id="{87DE6118-2437-4B30-8E3C-4D2BE6020583}" type="datetimeFigureOut">
               <a:rPr lang="en-US" dirty="0"/>
-              <a:t>12/2/2021</a:t>
+              <a:t>12/4/2021</a:t>
             </a:fld>
             <a:endParaRPr lang="en-US" dirty="0"/>
           </a:p>
@@ -8736,7 +8739,7 @@
           <a:p>
             <a:fld id="{87DE6118-2437-4B30-8E3C-4D2BE6020583}" type="datetimeFigureOut">
               <a:rPr lang="en-US" dirty="0"/>
-              <a:t>12/2/2021</a:t>
+              <a:t>12/4/2021</a:t>
             </a:fld>
             <a:endParaRPr lang="en-US" dirty="0"/>
           </a:p>
@@ -8901,7 +8904,7 @@
           <a:p>
             <a:fld id="{87DE6118-2437-4B30-8E3C-4D2BE6020583}" type="datetimeFigureOut">
               <a:rPr lang="en-US" dirty="0"/>
-              <a:t>12/2/2021</a:t>
+              <a:t>12/4/2021</a:t>
             </a:fld>
             <a:endParaRPr lang="en-US" dirty="0"/>
           </a:p>
@@ -9174,7 +9177,7 @@
             <a:fld id="{87DE6118-2437-4B30-8E3C-4D2BE6020583}" type="datetimeFigureOut">
               <a:rPr lang="en-US" dirty="0"/>
               <a:pPr/>
-              <a:t>12/2/2021</a:t>
+              <a:t>12/4/2021</a:t>
             </a:fld>
             <a:endParaRPr lang="en-US" dirty="0"/>
           </a:p>
@@ -9564,7 +9567,7 @@
           <a:p>
             <a:fld id="{87DE6118-2437-4B30-8E3C-4D2BE6020583}" type="datetimeFigureOut">
               <a:rPr lang="en-US" dirty="0"/>
-              <a:t>12/2/2021</a:t>
+              <a:t>12/4/2021</a:t>
             </a:fld>
             <a:endParaRPr lang="en-US" dirty="0"/>
           </a:p>
@@ -10036,7 +10039,7 @@
           <a:p>
             <a:fld id="{87DE6118-2437-4B30-8E3C-4D2BE6020583}" type="datetimeFigureOut">
               <a:rPr lang="en-US" dirty="0"/>
-              <a:t>12/2/2021</a:t>
+              <a:t>12/4/2021</a:t>
             </a:fld>
             <a:endParaRPr lang="en-US" dirty="0"/>
           </a:p>
@@ -10149,7 +10152,7 @@
           <a:p>
             <a:fld id="{87DE6118-2437-4B30-8E3C-4D2BE6020583}" type="datetimeFigureOut">
               <a:rPr lang="en-US" dirty="0"/>
-              <a:t>12/2/2021</a:t>
+              <a:t>12/4/2021</a:t>
             </a:fld>
             <a:endParaRPr lang="en-US" dirty="0"/>
           </a:p>
@@ -10239,7 +10242,7 @@
           <a:p>
             <a:fld id="{87DE6118-2437-4B30-8E3C-4D2BE6020583}" type="datetimeFigureOut">
               <a:rPr lang="en-US" dirty="0"/>
-              <a:t>12/2/2021</a:t>
+              <a:t>12/4/2021</a:t>
             </a:fld>
             <a:endParaRPr lang="en-US" dirty="0"/>
           </a:p>
@@ -10581,7 +10584,7 @@
             <a:fld id="{87DE6118-2437-4B30-8E3C-4D2BE6020583}" type="datetimeFigureOut">
               <a:rPr lang="en-US" dirty="0"/>
               <a:pPr/>
-              <a:t>12/2/2021</a:t>
+              <a:t>12/4/2021</a:t>
             </a:fld>
             <a:endParaRPr lang="en-US" dirty="0"/>
           </a:p>
@@ -10966,7 +10969,7 @@
             <a:fld id="{87DE6118-2437-4B30-8E3C-4D2BE6020583}" type="datetimeFigureOut">
               <a:rPr lang="en-US" dirty="0"/>
               <a:pPr/>
-              <a:t>12/2/2021</a:t>
+              <a:t>12/4/2021</a:t>
             </a:fld>
             <a:endParaRPr lang="en-US" dirty="0"/>
           </a:p>
@@ -11241,7 +11244,7 @@
             <a:fld id="{87DE6118-2437-4B30-8E3C-4D2BE6020583}" type="datetimeFigureOut">
               <a:rPr lang="en-US" dirty="0"/>
               <a:pPr/>
-              <a:t>12/2/2021</a:t>
+              <a:t>12/4/2021</a:t>
             </a:fld>
             <a:endParaRPr lang="en-US" dirty="0"/>
           </a:p>
@@ -11683,7 +11686,7 @@
       </a:lvl9pPr>
     </p:otherStyle>
   </p:txStyles>
-  <p:extLst mod="1">
+  <p:extLst>
     <p:ext uri="{27BBF7A9-308A-43DC-89C8-2F10F3537804}">
       <p15:sldGuideLst xmlns:p15="http://schemas.microsoft.com/office/powerpoint/2012/main">
         <p15:guide id="3" orient="horz" pos="1368">
@@ -12058,7 +12061,7 @@
         <p:spPr>
           <a:xfrm>
             <a:off x="466165" y="2177185"/>
-            <a:ext cx="2357717" cy="2800767"/>
+            <a:ext cx="2357717" cy="2308324"/>
           </a:xfrm>
           <a:prstGeom prst="rect">
             <a:avLst/>
@@ -12076,6 +12079,7 @@
                 <a:highlight>
                   <a:srgbClr val="000000"/>
                 </a:highlight>
+                <a:latin typeface="Bahnschrift Light Condensed" panose="020B0502040204020203" pitchFamily="34" charset="0"/>
               </a:rPr>
               <a:t>All’inserimento del </a:t>
             </a:r>
@@ -12084,6 +12088,7 @@
                 <a:highlight>
                   <a:srgbClr val="000000"/>
                 </a:highlight>
+                <a:latin typeface="Bahnschrift Light Condensed" panose="020B0502040204020203" pitchFamily="34" charset="0"/>
               </a:rPr>
               <a:t>barcode</a:t>
             </a:r>
@@ -12092,6 +12097,7 @@
                 <a:highlight>
                   <a:srgbClr val="000000"/>
                 </a:highlight>
+                <a:latin typeface="Bahnschrift Light Condensed" panose="020B0502040204020203" pitchFamily="34" charset="0"/>
               </a:rPr>
               <a:t> </a:t>
             </a:r>
@@ -12100,6 +12106,7 @@
                 <a:highlight>
                   <a:srgbClr val="000000"/>
                 </a:highlight>
+                <a:latin typeface="Bahnschrift Light Condensed" panose="020B0502040204020203" pitchFamily="34" charset="0"/>
               </a:rPr>
             </a:br>
             <a:r>
@@ -12107,6 +12114,7 @@
                 <a:highlight>
                   <a:srgbClr val="000000"/>
                 </a:highlight>
+                <a:latin typeface="Bahnschrift Light Condensed" panose="020B0502040204020203" pitchFamily="34" charset="0"/>
               </a:rPr>
               <a:t>il software ricerca automaticamente se è presente un pc con lo stesso </a:t>
             </a:r>
@@ -12115,6 +12123,7 @@
                 <a:highlight>
                   <a:srgbClr val="000000"/>
                 </a:highlight>
+                <a:latin typeface="Bahnschrift Light Condensed" panose="020B0502040204020203" pitchFamily="34" charset="0"/>
               </a:rPr>
               <a:t>barcode</a:t>
             </a:r>
@@ -12123,6 +12132,7 @@
                 <a:highlight>
                   <a:srgbClr val="000000"/>
                 </a:highlight>
+                <a:latin typeface="Bahnschrift Light Condensed" panose="020B0502040204020203" pitchFamily="34" charset="0"/>
               </a:rPr>
               <a:t>. Nel caso di riscontro positivo le box «modello» e «stato»</a:t>
             </a:r>
@@ -12133,6 +12143,7 @@
                 <a:highlight>
                   <a:srgbClr val="000000"/>
                 </a:highlight>
+                <a:latin typeface="Bahnschrift Light Condensed" panose="020B0502040204020203" pitchFamily="34" charset="0"/>
               </a:rPr>
               <a:t>verranno riempite con le relative informazioni in memoria. </a:t>
             </a:r>
@@ -12432,6 +12443,573 @@
 </file>
 
 <file path=ppt/slides/slide11.xml><?xml version="1.0" encoding="utf-8"?>
+<p:sld xmlns:a="http://schemas.openxmlformats.org/drawingml/2006/main" xmlns:r="http://schemas.openxmlformats.org/officeDocument/2006/relationships" xmlns:p="http://schemas.openxmlformats.org/presentationml/2006/main">
+  <p:cSld>
+    <p:spTree>
+      <p:nvGrpSpPr>
+        <p:cNvPr id="1" name=""/>
+        <p:cNvGrpSpPr/>
+        <p:nvPr/>
+      </p:nvGrpSpPr>
+      <p:grpSpPr>
+        <a:xfrm>
+          <a:off x="0" y="0"/>
+          <a:ext cx="0" cy="0"/>
+          <a:chOff x="0" y="0"/>
+          <a:chExt cx="0" cy="0"/>
+        </a:xfrm>
+      </p:grpSpPr>
+      <p:sp>
+        <p:nvSpPr>
+          <p:cNvPr id="2" name="Titolo 1">
+            <a:extLst>
+              <a:ext uri="{FF2B5EF4-FFF2-40B4-BE49-F238E27FC236}">
+                <a16:creationId xmlns:a16="http://schemas.microsoft.com/office/drawing/2014/main" id="{87065FD7-9B77-4F90-AE4C-939A4785A565}"/>
+              </a:ext>
+            </a:extLst>
+          </p:cNvPr>
+          <p:cNvSpPr>
+            <a:spLocks noGrp="1"/>
+          </p:cNvSpPr>
+          <p:nvPr>
+            <p:ph type="title"/>
+          </p:nvPr>
+        </p:nvSpPr>
+        <p:spPr>
+          <a:xfrm>
+            <a:off x="765025" y="482347"/>
+            <a:ext cx="10167135" cy="1016001"/>
+          </a:xfrm>
+        </p:spPr>
+        <p:txBody>
+          <a:bodyPr>
+            <a:noAutofit/>
+          </a:bodyPr>
+          <a:lstStyle/>
+          <a:p>
+            <a:pPr algn="l"/>
+            <a:r>
+              <a:rPr lang="it-IT" sz="6000" dirty="0"/>
+              <a:t>Noleggio pc a professore</a:t>
+            </a:r>
+          </a:p>
+        </p:txBody>
+      </p:sp>
+      <p:pic>
+        <p:nvPicPr>
+          <p:cNvPr id="7" name="Immagine 6">
+            <a:extLst>
+              <a:ext uri="{FF2B5EF4-FFF2-40B4-BE49-F238E27FC236}">
+                <a16:creationId xmlns:a16="http://schemas.microsoft.com/office/drawing/2014/main" id="{21F7A648-0EDD-45DC-B480-4412B7F2C16A}"/>
+              </a:ext>
+            </a:extLst>
+          </p:cNvPr>
+          <p:cNvPicPr>
+            <a:picLocks noChangeAspect="1"/>
+          </p:cNvPicPr>
+          <p:nvPr/>
+        </p:nvPicPr>
+        <p:blipFill>
+          <a:blip r:embed="rId2"/>
+          <a:stretch>
+            <a:fillRect/>
+          </a:stretch>
+        </p:blipFill>
+        <p:spPr>
+          <a:xfrm>
+            <a:off x="2509392" y="1691568"/>
+            <a:ext cx="6908928" cy="3806961"/>
+          </a:xfrm>
+          <a:prstGeom prst="rect">
+            <a:avLst/>
+          </a:prstGeom>
+        </p:spPr>
+      </p:pic>
+      <p:cxnSp>
+        <p:nvCxnSpPr>
+          <p:cNvPr id="11" name="Connettore a gomito 10">
+            <a:extLst>
+              <a:ext uri="{FF2B5EF4-FFF2-40B4-BE49-F238E27FC236}">
+                <a16:creationId xmlns:a16="http://schemas.microsoft.com/office/drawing/2014/main" id="{364259BF-CA35-438A-B8F7-48984A4ACAD0}"/>
+              </a:ext>
+            </a:extLst>
+          </p:cNvPr>
+          <p:cNvCxnSpPr/>
+          <p:nvPr/>
+        </p:nvCxnSpPr>
+        <p:spPr>
+          <a:xfrm rot="10800000">
+            <a:off x="2651760" y="2042160"/>
+            <a:ext cx="1361440" cy="914400"/>
+          </a:xfrm>
+          <a:prstGeom prst="bentConnector3">
+            <a:avLst/>
+          </a:prstGeom>
+          <a:ln>
+            <a:tailEnd type="triangle"/>
+          </a:ln>
+        </p:spPr>
+        <p:style>
+          <a:lnRef idx="2">
+            <a:schemeClr val="dk1"/>
+          </a:lnRef>
+          <a:fillRef idx="0">
+            <a:schemeClr val="dk1"/>
+          </a:fillRef>
+          <a:effectRef idx="1">
+            <a:schemeClr val="dk1"/>
+          </a:effectRef>
+          <a:fontRef idx="minor">
+            <a:schemeClr val="tx1"/>
+          </a:fontRef>
+        </p:style>
+      </p:cxnSp>
+      <p:sp>
+        <p:nvSpPr>
+          <p:cNvPr id="13" name="CasellaDiTesto 12">
+            <a:extLst>
+              <a:ext uri="{FF2B5EF4-FFF2-40B4-BE49-F238E27FC236}">
+                <a16:creationId xmlns:a16="http://schemas.microsoft.com/office/drawing/2014/main" id="{7C06A747-54F9-434C-A5BB-A14E384C25B3}"/>
+              </a:ext>
+            </a:extLst>
+          </p:cNvPr>
+          <p:cNvSpPr txBox="1"/>
+          <p:nvPr/>
+        </p:nvSpPr>
+        <p:spPr>
+          <a:xfrm>
+            <a:off x="355600" y="1859339"/>
+            <a:ext cx="2032000" cy="3046988"/>
+          </a:xfrm>
+          <a:prstGeom prst="rect">
+            <a:avLst/>
+          </a:prstGeom>
+          <a:noFill/>
+        </p:spPr>
+        <p:txBody>
+          <a:bodyPr wrap="square" rtlCol="0">
+            <a:spAutoFit/>
+          </a:bodyPr>
+          <a:lstStyle/>
+          <a:p>
+            <a:r>
+              <a:rPr lang="it-IT" sz="1600" b="1" dirty="0">
+                <a:highlight>
+                  <a:srgbClr val="000000"/>
+                </a:highlight>
+                <a:latin typeface="Bahnschrift Light SemiCondensed" panose="020B0502040204020203" pitchFamily="34" charset="0"/>
+              </a:rPr>
+              <a:t>All’inserimento del </a:t>
+            </a:r>
+            <a:r>
+              <a:rPr lang="it-IT" sz="1600" b="1" dirty="0" err="1">
+                <a:highlight>
+                  <a:srgbClr val="000000"/>
+                </a:highlight>
+                <a:latin typeface="Bahnschrift Light SemiCondensed" panose="020B0502040204020203" pitchFamily="34" charset="0"/>
+              </a:rPr>
+              <a:t>barcode</a:t>
+            </a:r>
+            <a:r>
+              <a:rPr lang="it-IT" sz="1600" b="1" dirty="0">
+                <a:highlight>
+                  <a:srgbClr val="000000"/>
+                </a:highlight>
+                <a:latin typeface="Bahnschrift Light SemiCondensed" panose="020B0502040204020203" pitchFamily="34" charset="0"/>
+              </a:rPr>
+              <a:t> </a:t>
+            </a:r>
+            <a:br>
+              <a:rPr lang="it-IT" sz="1600" b="1" dirty="0">
+                <a:highlight>
+                  <a:srgbClr val="000000"/>
+                </a:highlight>
+                <a:latin typeface="Bahnschrift Light SemiCondensed" panose="020B0502040204020203" pitchFamily="34" charset="0"/>
+              </a:rPr>
+            </a:br>
+            <a:r>
+              <a:rPr lang="it-IT" sz="1600" b="1" dirty="0">
+                <a:highlight>
+                  <a:srgbClr val="000000"/>
+                </a:highlight>
+                <a:latin typeface="Bahnschrift Light SemiCondensed" panose="020B0502040204020203" pitchFamily="34" charset="0"/>
+              </a:rPr>
+              <a:t>il software ricerca automaticamente se è presente un pc con lo stesso </a:t>
+            </a:r>
+            <a:r>
+              <a:rPr lang="it-IT" sz="1600" b="1" dirty="0" err="1">
+                <a:highlight>
+                  <a:srgbClr val="000000"/>
+                </a:highlight>
+                <a:latin typeface="Bahnschrift Light SemiCondensed" panose="020B0502040204020203" pitchFamily="34" charset="0"/>
+              </a:rPr>
+              <a:t>barcode</a:t>
+            </a:r>
+            <a:r>
+              <a:rPr lang="it-IT" sz="1600" b="1" dirty="0">
+                <a:highlight>
+                  <a:srgbClr val="000000"/>
+                </a:highlight>
+                <a:latin typeface="Bahnschrift Light SemiCondensed" panose="020B0502040204020203" pitchFamily="34" charset="0"/>
+              </a:rPr>
+              <a:t>. Nel caso di riscontro positivo le box «modello» e «stato»</a:t>
+            </a:r>
+          </a:p>
+          <a:p>
+            <a:r>
+              <a:rPr lang="it-IT" sz="1600" b="1" dirty="0">
+                <a:highlight>
+                  <a:srgbClr val="000000"/>
+                </a:highlight>
+                <a:latin typeface="Bahnschrift Light SemiCondensed" panose="020B0502040204020203" pitchFamily="34" charset="0"/>
+              </a:rPr>
+              <a:t>verranno riempite con le relative informazioni in memoria</a:t>
+            </a:r>
+            <a:endParaRPr lang="it-IT" sz="1600" dirty="0">
+              <a:latin typeface="Bahnschrift Light SemiCondensed" panose="020B0502040204020203" pitchFamily="34" charset="0"/>
+            </a:endParaRPr>
+          </a:p>
+        </p:txBody>
+      </p:sp>
+      <p:cxnSp>
+        <p:nvCxnSpPr>
+          <p:cNvPr id="15" name="Connettore a gomito 14">
+            <a:extLst>
+              <a:ext uri="{FF2B5EF4-FFF2-40B4-BE49-F238E27FC236}">
+                <a16:creationId xmlns:a16="http://schemas.microsoft.com/office/drawing/2014/main" id="{B2D2A374-A11D-4E3B-B81C-6460C521D5A6}"/>
+              </a:ext>
+            </a:extLst>
+          </p:cNvPr>
+          <p:cNvCxnSpPr/>
+          <p:nvPr/>
+        </p:nvCxnSpPr>
+        <p:spPr>
+          <a:xfrm rot="10800000" flipV="1">
+            <a:off x="7071360" y="5069840"/>
+            <a:ext cx="1300480" cy="203200"/>
+          </a:xfrm>
+          <a:prstGeom prst="bentConnector3">
+            <a:avLst/>
+          </a:prstGeom>
+          <a:ln>
+            <a:tailEnd type="triangle"/>
+          </a:ln>
+        </p:spPr>
+        <p:style>
+          <a:lnRef idx="2">
+            <a:schemeClr val="dk1"/>
+          </a:lnRef>
+          <a:fillRef idx="0">
+            <a:schemeClr val="dk1"/>
+          </a:fillRef>
+          <a:effectRef idx="1">
+            <a:schemeClr val="dk1"/>
+          </a:effectRef>
+          <a:fontRef idx="minor">
+            <a:schemeClr val="tx1"/>
+          </a:fontRef>
+        </p:style>
+      </p:cxnSp>
+      <p:sp>
+        <p:nvSpPr>
+          <p:cNvPr id="16" name="CasellaDiTesto 15">
+            <a:extLst>
+              <a:ext uri="{FF2B5EF4-FFF2-40B4-BE49-F238E27FC236}">
+                <a16:creationId xmlns:a16="http://schemas.microsoft.com/office/drawing/2014/main" id="{9B4C1B89-3A55-4AF5-94D4-826AB40D0BF5}"/>
+              </a:ext>
+            </a:extLst>
+          </p:cNvPr>
+          <p:cNvSpPr txBox="1"/>
+          <p:nvPr/>
+        </p:nvSpPr>
+        <p:spPr>
+          <a:xfrm>
+            <a:off x="4594082" y="5119152"/>
+            <a:ext cx="2509020" cy="307777"/>
+          </a:xfrm>
+          <a:prstGeom prst="rect">
+            <a:avLst/>
+          </a:prstGeom>
+          <a:noFill/>
+        </p:spPr>
+        <p:txBody>
+          <a:bodyPr wrap="none" rtlCol="0">
+            <a:spAutoFit/>
+          </a:bodyPr>
+          <a:lstStyle/>
+          <a:p>
+            <a:r>
+              <a:rPr lang="it-IT" sz="1400" b="1" dirty="0">
+                <a:highlight>
+                  <a:srgbClr val="000000"/>
+                </a:highlight>
+                <a:latin typeface="Bahnschrift Light Condensed" panose="020B0502040204020203" pitchFamily="34" charset="0"/>
+              </a:rPr>
+              <a:t>Permette di salvare e  noleggiare il pc </a:t>
+            </a:r>
+          </a:p>
+        </p:txBody>
+      </p:sp>
+    </p:spTree>
+    <p:extLst>
+      <p:ext uri="{BB962C8B-B14F-4D97-AF65-F5344CB8AC3E}">
+        <p14:creationId xmlns:p14="http://schemas.microsoft.com/office/powerpoint/2010/main" val="3419773658"/>
+      </p:ext>
+    </p:extLst>
+  </p:cSld>
+  <p:clrMapOvr>
+    <a:masterClrMapping/>
+  </p:clrMapOvr>
+  <p:timing>
+    <p:tnLst>
+      <p:par>
+        <p:cTn id="1" dur="indefinite" restart="never" nodeType="tmRoot">
+          <p:childTnLst>
+            <p:seq concurrent="1" nextAc="seek">
+              <p:cTn id="2" dur="indefinite" nodeType="mainSeq">
+                <p:childTnLst>
+                  <p:par>
+                    <p:cTn id="3" fill="hold">
+                      <p:stCondLst>
+                        <p:cond delay="indefinite"/>
+                      </p:stCondLst>
+                      <p:childTnLst>
+                        <p:par>
+                          <p:cTn id="4" fill="hold">
+                            <p:stCondLst>
+                              <p:cond delay="0"/>
+                            </p:stCondLst>
+                            <p:childTnLst>
+                              <p:par>
+                                <p:cTn id="5" presetID="22" presetClass="entr" presetSubtype="4" fill="hold" nodeType="clickEffect">
+                                  <p:stCondLst>
+                                    <p:cond delay="0"/>
+                                  </p:stCondLst>
+                                  <p:childTnLst>
+                                    <p:set>
+                                      <p:cBhvr>
+                                        <p:cTn id="6" dur="1" fill="hold">
+                                          <p:stCondLst>
+                                            <p:cond delay="0"/>
+                                          </p:stCondLst>
+                                        </p:cTn>
+                                        <p:tgtEl>
+                                          <p:spTgt spid="11"/>
+                                        </p:tgtEl>
+                                        <p:attrNameLst>
+                                          <p:attrName>style.visibility</p:attrName>
+                                        </p:attrNameLst>
+                                      </p:cBhvr>
+                                      <p:to>
+                                        <p:strVal val="visible"/>
+                                      </p:to>
+                                    </p:set>
+                                    <p:animEffect transition="in" filter="wipe(down)">
+                                      <p:cBhvr>
+                                        <p:cTn id="7" dur="500"/>
+                                        <p:tgtEl>
+                                          <p:spTgt spid="11"/>
+                                        </p:tgtEl>
+                                      </p:cBhvr>
+                                    </p:animEffect>
+                                  </p:childTnLst>
+                                </p:cTn>
+                              </p:par>
+                            </p:childTnLst>
+                          </p:cTn>
+                        </p:par>
+                      </p:childTnLst>
+                    </p:cTn>
+                  </p:par>
+                  <p:par>
+                    <p:cTn id="8" fill="hold">
+                      <p:stCondLst>
+                        <p:cond delay="indefinite"/>
+                      </p:stCondLst>
+                      <p:childTnLst>
+                        <p:par>
+                          <p:cTn id="9" fill="hold">
+                            <p:stCondLst>
+                              <p:cond delay="0"/>
+                            </p:stCondLst>
+                            <p:childTnLst>
+                              <p:par>
+                                <p:cTn id="10" presetID="10" presetClass="entr" presetSubtype="0" fill="hold" grpId="0" nodeType="clickEffect">
+                                  <p:stCondLst>
+                                    <p:cond delay="0"/>
+                                  </p:stCondLst>
+                                  <p:childTnLst>
+                                    <p:set>
+                                      <p:cBhvr>
+                                        <p:cTn id="11" dur="1" fill="hold">
+                                          <p:stCondLst>
+                                            <p:cond delay="0"/>
+                                          </p:stCondLst>
+                                        </p:cTn>
+                                        <p:tgtEl>
+                                          <p:spTgt spid="13"/>
+                                        </p:tgtEl>
+                                        <p:attrNameLst>
+                                          <p:attrName>style.visibility</p:attrName>
+                                        </p:attrNameLst>
+                                      </p:cBhvr>
+                                      <p:to>
+                                        <p:strVal val="visible"/>
+                                      </p:to>
+                                    </p:set>
+                                    <p:animEffect transition="in" filter="fade">
+                                      <p:cBhvr>
+                                        <p:cTn id="12" dur="500"/>
+                                        <p:tgtEl>
+                                          <p:spTgt spid="13"/>
+                                        </p:tgtEl>
+                                      </p:cBhvr>
+                                    </p:animEffect>
+                                  </p:childTnLst>
+                                </p:cTn>
+                              </p:par>
+                            </p:childTnLst>
+                          </p:cTn>
+                        </p:par>
+                      </p:childTnLst>
+                    </p:cTn>
+                  </p:par>
+                  <p:par>
+                    <p:cTn id="13" fill="hold">
+                      <p:stCondLst>
+                        <p:cond delay="indefinite"/>
+                      </p:stCondLst>
+                      <p:childTnLst>
+                        <p:par>
+                          <p:cTn id="14" fill="hold">
+                            <p:stCondLst>
+                              <p:cond delay="0"/>
+                            </p:stCondLst>
+                            <p:childTnLst>
+                              <p:par>
+                                <p:cTn id="15" presetID="22" presetClass="entr" presetSubtype="4" fill="hold" nodeType="clickEffect">
+                                  <p:stCondLst>
+                                    <p:cond delay="0"/>
+                                  </p:stCondLst>
+                                  <p:childTnLst>
+                                    <p:set>
+                                      <p:cBhvr>
+                                        <p:cTn id="16" dur="1" fill="hold">
+                                          <p:stCondLst>
+                                            <p:cond delay="0"/>
+                                          </p:stCondLst>
+                                        </p:cTn>
+                                        <p:tgtEl>
+                                          <p:spTgt spid="15"/>
+                                        </p:tgtEl>
+                                        <p:attrNameLst>
+                                          <p:attrName>style.visibility</p:attrName>
+                                        </p:attrNameLst>
+                                      </p:cBhvr>
+                                      <p:to>
+                                        <p:strVal val="visible"/>
+                                      </p:to>
+                                    </p:set>
+                                    <p:animEffect transition="in" filter="wipe(down)">
+                                      <p:cBhvr>
+                                        <p:cTn id="17" dur="500"/>
+                                        <p:tgtEl>
+                                          <p:spTgt spid="15"/>
+                                        </p:tgtEl>
+                                      </p:cBhvr>
+                                    </p:animEffect>
+                                  </p:childTnLst>
+                                </p:cTn>
+                              </p:par>
+                            </p:childTnLst>
+                          </p:cTn>
+                        </p:par>
+                      </p:childTnLst>
+                    </p:cTn>
+                  </p:par>
+                  <p:par>
+                    <p:cTn id="18" fill="hold">
+                      <p:stCondLst>
+                        <p:cond delay="indefinite"/>
+                      </p:stCondLst>
+                      <p:childTnLst>
+                        <p:par>
+                          <p:cTn id="19" fill="hold">
+                            <p:stCondLst>
+                              <p:cond delay="0"/>
+                            </p:stCondLst>
+                            <p:childTnLst>
+                              <p:par>
+                                <p:cTn id="20" presetID="10" presetClass="entr" presetSubtype="0" fill="hold" grpId="0" nodeType="clickEffect">
+                                  <p:stCondLst>
+                                    <p:cond delay="0"/>
+                                  </p:stCondLst>
+                                  <p:childTnLst>
+                                    <p:set>
+                                      <p:cBhvr>
+                                        <p:cTn id="21" dur="1" fill="hold">
+                                          <p:stCondLst>
+                                            <p:cond delay="0"/>
+                                          </p:stCondLst>
+                                        </p:cTn>
+                                        <p:tgtEl>
+                                          <p:spTgt spid="16"/>
+                                        </p:tgtEl>
+                                        <p:attrNameLst>
+                                          <p:attrName>style.visibility</p:attrName>
+                                        </p:attrNameLst>
+                                      </p:cBhvr>
+                                      <p:to>
+                                        <p:strVal val="visible"/>
+                                      </p:to>
+                                    </p:set>
+                                    <p:animEffect transition="in" filter="fade">
+                                      <p:cBhvr>
+                                        <p:cTn id="22" dur="500"/>
+                                        <p:tgtEl>
+                                          <p:spTgt spid="16"/>
+                                        </p:tgtEl>
+                                      </p:cBhvr>
+                                    </p:animEffect>
+                                  </p:childTnLst>
+                                </p:cTn>
+                              </p:par>
+                            </p:childTnLst>
+                          </p:cTn>
+                        </p:par>
+                      </p:childTnLst>
+                    </p:cTn>
+                  </p:par>
+                </p:childTnLst>
+              </p:cTn>
+              <p:prevCondLst>
+                <p:cond evt="onPrev" delay="0">
+                  <p:tgtEl>
+                    <p:sldTgt/>
+                  </p:tgtEl>
+                </p:cond>
+              </p:prevCondLst>
+              <p:nextCondLst>
+                <p:cond evt="onNext" delay="0">
+                  <p:tgtEl>
+                    <p:sldTgt/>
+                  </p:tgtEl>
+                </p:cond>
+              </p:nextCondLst>
+            </p:seq>
+          </p:childTnLst>
+        </p:cTn>
+      </p:par>
+    </p:tnLst>
+    <p:bldLst>
+      <p:bldP spid="13" grpId="0"/>
+      <p:bldP spid="16" grpId="0"/>
+    </p:bldLst>
+  </p:timing>
+</p:sld>
+</file>
+
+<file path=ppt/slides/slide12.xml><?xml version="1.0" encoding="utf-8"?>
 <p:sld xmlns:a="http://schemas.openxmlformats.org/drawingml/2006/main" xmlns:r="http://schemas.openxmlformats.org/officeDocument/2006/relationships" xmlns:p="http://schemas.openxmlformats.org/presentationml/2006/main">
   <p:cSld>
     <p:spTree>
@@ -13773,6 +14351,1213 @@
       <p:bldP spid="9" grpId="0" build="p"/>
       <p:bldP spid="11" grpId="0"/>
       <p:bldP spid="13" grpId="0"/>
+    </p:bldLst>
+  </p:timing>
+</p:sld>
+</file>
+
+<file path=ppt/slides/slide13.xml><?xml version="1.0" encoding="utf-8"?>
+<p:sld xmlns:a="http://schemas.openxmlformats.org/drawingml/2006/main" xmlns:r="http://schemas.openxmlformats.org/officeDocument/2006/relationships" xmlns:p="http://schemas.openxmlformats.org/presentationml/2006/main">
+  <p:cSld>
+    <p:spTree>
+      <p:nvGrpSpPr>
+        <p:cNvPr id="1" name=""/>
+        <p:cNvGrpSpPr/>
+        <p:nvPr/>
+      </p:nvGrpSpPr>
+      <p:grpSpPr>
+        <a:xfrm>
+          <a:off x="0" y="0"/>
+          <a:ext cx="0" cy="0"/>
+          <a:chOff x="0" y="0"/>
+          <a:chExt cx="0" cy="0"/>
+        </a:xfrm>
+      </p:grpSpPr>
+      <p:sp>
+        <p:nvSpPr>
+          <p:cNvPr id="2" name="Titolo 1">
+            <a:extLst>
+              <a:ext uri="{FF2B5EF4-FFF2-40B4-BE49-F238E27FC236}">
+                <a16:creationId xmlns:a16="http://schemas.microsoft.com/office/drawing/2014/main" id="{899D6E82-5762-4C33-8510-E840A5CE6AE7}"/>
+              </a:ext>
+            </a:extLst>
+          </p:cNvPr>
+          <p:cNvSpPr>
+            <a:spLocks noGrp="1"/>
+          </p:cNvSpPr>
+          <p:nvPr>
+            <p:ph type="title"/>
+          </p:nvPr>
+        </p:nvSpPr>
+        <p:spPr>
+          <a:xfrm>
+            <a:off x="765025" y="440293"/>
+            <a:ext cx="9612971" cy="1143324"/>
+          </a:xfrm>
+        </p:spPr>
+        <p:txBody>
+          <a:bodyPr>
+            <a:normAutofit/>
+          </a:bodyPr>
+          <a:lstStyle/>
+          <a:p>
+            <a:pPr algn="l"/>
+            <a:r>
+              <a:rPr lang="it-IT" sz="6600" dirty="0"/>
+              <a:t>elimina</a:t>
+            </a:r>
+          </a:p>
+        </p:txBody>
+      </p:sp>
+      <p:pic>
+        <p:nvPicPr>
+          <p:cNvPr id="5" name="Immagine 4">
+            <a:extLst>
+              <a:ext uri="{FF2B5EF4-FFF2-40B4-BE49-F238E27FC236}">
+                <a16:creationId xmlns:a16="http://schemas.microsoft.com/office/drawing/2014/main" id="{2CF92FAA-BB2D-427E-B5BD-F65D91B607F9}"/>
+              </a:ext>
+            </a:extLst>
+          </p:cNvPr>
+          <p:cNvPicPr>
+            <a:picLocks noChangeAspect="1"/>
+          </p:cNvPicPr>
+          <p:nvPr/>
+        </p:nvPicPr>
+        <p:blipFill>
+          <a:blip r:embed="rId2"/>
+          <a:stretch>
+            <a:fillRect/>
+          </a:stretch>
+        </p:blipFill>
+        <p:spPr>
+          <a:xfrm>
+            <a:off x="2550160" y="1583617"/>
+            <a:ext cx="7091680" cy="3719925"/>
+          </a:xfrm>
+          <a:prstGeom prst="rect">
+            <a:avLst/>
+          </a:prstGeom>
+        </p:spPr>
+      </p:pic>
+      <p:cxnSp>
+        <p:nvCxnSpPr>
+          <p:cNvPr id="7" name="Connettore 2 6">
+            <a:extLst>
+              <a:ext uri="{FF2B5EF4-FFF2-40B4-BE49-F238E27FC236}">
+                <a16:creationId xmlns:a16="http://schemas.microsoft.com/office/drawing/2014/main" id="{69BAC04E-DC4C-4DA5-9850-D3DEF74FE158}"/>
+              </a:ext>
+            </a:extLst>
+          </p:cNvPr>
+          <p:cNvCxnSpPr/>
+          <p:nvPr/>
+        </p:nvCxnSpPr>
+        <p:spPr>
+          <a:xfrm flipH="1" flipV="1">
+            <a:off x="4114800" y="2590800"/>
+            <a:ext cx="1046480" cy="629920"/>
+          </a:xfrm>
+          <a:prstGeom prst="straightConnector1">
+            <a:avLst/>
+          </a:prstGeom>
+          <a:ln>
+            <a:tailEnd type="triangle"/>
+          </a:ln>
+        </p:spPr>
+        <p:style>
+          <a:lnRef idx="2">
+            <a:schemeClr val="dk1"/>
+          </a:lnRef>
+          <a:fillRef idx="0">
+            <a:schemeClr val="dk1"/>
+          </a:fillRef>
+          <a:effectRef idx="1">
+            <a:schemeClr val="dk1"/>
+          </a:effectRef>
+          <a:fontRef idx="minor">
+            <a:schemeClr val="tx1"/>
+          </a:fontRef>
+        </p:style>
+      </p:cxnSp>
+      <p:sp>
+        <p:nvSpPr>
+          <p:cNvPr id="8" name="CasellaDiTesto 7">
+            <a:extLst>
+              <a:ext uri="{FF2B5EF4-FFF2-40B4-BE49-F238E27FC236}">
+                <a16:creationId xmlns:a16="http://schemas.microsoft.com/office/drawing/2014/main" id="{5A3846AA-E741-418D-9873-85429E3EA648}"/>
+              </a:ext>
+            </a:extLst>
+          </p:cNvPr>
+          <p:cNvSpPr txBox="1"/>
+          <p:nvPr/>
+        </p:nvSpPr>
+        <p:spPr>
+          <a:xfrm>
+            <a:off x="2590800" y="2147974"/>
+            <a:ext cx="1524000" cy="954107"/>
+          </a:xfrm>
+          <a:prstGeom prst="rect">
+            <a:avLst/>
+          </a:prstGeom>
+          <a:noFill/>
+        </p:spPr>
+        <p:txBody>
+          <a:bodyPr wrap="square" rtlCol="0">
+            <a:spAutoFit/>
+          </a:bodyPr>
+          <a:lstStyle/>
+          <a:p>
+            <a:r>
+              <a:rPr lang="it-IT" sz="1400" b="1" dirty="0">
+                <a:highlight>
+                  <a:srgbClr val="000000"/>
+                </a:highlight>
+                <a:latin typeface="Bahnschrift Light Condensed" panose="020B0502040204020203" pitchFamily="34" charset="0"/>
+              </a:rPr>
+              <a:t>In questa box verrà inserito il bar code del pc che si vuole eliminare </a:t>
+            </a:r>
+          </a:p>
+        </p:txBody>
+      </p:sp>
+      <p:cxnSp>
+        <p:nvCxnSpPr>
+          <p:cNvPr id="13" name="Connettore 2 12">
+            <a:extLst>
+              <a:ext uri="{FF2B5EF4-FFF2-40B4-BE49-F238E27FC236}">
+                <a16:creationId xmlns:a16="http://schemas.microsoft.com/office/drawing/2014/main" id="{E2214EBA-5E7C-46EE-BAF4-424B4368415C}"/>
+              </a:ext>
+            </a:extLst>
+          </p:cNvPr>
+          <p:cNvCxnSpPr/>
+          <p:nvPr/>
+        </p:nvCxnSpPr>
+        <p:spPr>
+          <a:xfrm flipV="1">
+            <a:off x="8768080" y="3677920"/>
+            <a:ext cx="0" cy="812800"/>
+          </a:xfrm>
+          <a:prstGeom prst="straightConnector1">
+            <a:avLst/>
+          </a:prstGeom>
+          <a:ln>
+            <a:tailEnd type="triangle"/>
+          </a:ln>
+        </p:spPr>
+        <p:style>
+          <a:lnRef idx="2">
+            <a:schemeClr val="dk1"/>
+          </a:lnRef>
+          <a:fillRef idx="0">
+            <a:schemeClr val="dk1"/>
+          </a:fillRef>
+          <a:effectRef idx="1">
+            <a:schemeClr val="dk1"/>
+          </a:effectRef>
+          <a:fontRef idx="minor">
+            <a:schemeClr val="tx1"/>
+          </a:fontRef>
+        </p:style>
+      </p:cxnSp>
+      <p:sp>
+        <p:nvSpPr>
+          <p:cNvPr id="15" name="CasellaDiTesto 14">
+            <a:extLst>
+              <a:ext uri="{FF2B5EF4-FFF2-40B4-BE49-F238E27FC236}">
+                <a16:creationId xmlns:a16="http://schemas.microsoft.com/office/drawing/2014/main" id="{B5E5B9CD-E80D-4B1D-B106-1952F2D0ADD3}"/>
+              </a:ext>
+            </a:extLst>
+          </p:cNvPr>
+          <p:cNvSpPr txBox="1"/>
+          <p:nvPr/>
+        </p:nvSpPr>
+        <p:spPr>
+          <a:xfrm>
+            <a:off x="7574280" y="2305595"/>
+            <a:ext cx="2108199" cy="1323439"/>
+          </a:xfrm>
+          <a:prstGeom prst="rect">
+            <a:avLst/>
+          </a:prstGeom>
+          <a:noFill/>
+        </p:spPr>
+        <p:txBody>
+          <a:bodyPr wrap="square" rtlCol="0">
+            <a:spAutoFit/>
+          </a:bodyPr>
+          <a:lstStyle/>
+          <a:p>
+            <a:r>
+              <a:rPr lang="it-IT" sz="1600" b="1" dirty="0">
+                <a:highlight>
+                  <a:srgbClr val="000000"/>
+                </a:highlight>
+                <a:latin typeface="Bahnschrift Light Condensed" panose="020B0502040204020203" pitchFamily="34" charset="0"/>
+              </a:rPr>
+              <a:t>Il pulsante si attiverà quando verrà inserito un </a:t>
+            </a:r>
+            <a:r>
+              <a:rPr lang="it-IT" sz="1600" b="1" dirty="0" err="1">
+                <a:highlight>
+                  <a:srgbClr val="000000"/>
+                </a:highlight>
+                <a:latin typeface="Bahnschrift Light Condensed" panose="020B0502040204020203" pitchFamily="34" charset="0"/>
+              </a:rPr>
+              <a:t>barcode</a:t>
+            </a:r>
+            <a:r>
+              <a:rPr lang="it-IT" sz="1600" b="1" dirty="0">
+                <a:highlight>
+                  <a:srgbClr val="000000"/>
+                </a:highlight>
+                <a:latin typeface="Bahnschrift Light Condensed" panose="020B0502040204020203" pitchFamily="34" charset="0"/>
+              </a:rPr>
+              <a:t> e se premuto aprirà un’altra finestra di conferma</a:t>
+            </a:r>
+          </a:p>
+        </p:txBody>
+      </p:sp>
+    </p:spTree>
+    <p:extLst>
+      <p:ext uri="{BB962C8B-B14F-4D97-AF65-F5344CB8AC3E}">
+        <p14:creationId xmlns:p14="http://schemas.microsoft.com/office/powerpoint/2010/main" val="3776230674"/>
+      </p:ext>
+    </p:extLst>
+  </p:cSld>
+  <p:clrMapOvr>
+    <a:masterClrMapping/>
+  </p:clrMapOvr>
+  <p:timing>
+    <p:tnLst>
+      <p:par>
+        <p:cTn id="1" dur="indefinite" restart="never" nodeType="tmRoot">
+          <p:childTnLst>
+            <p:seq concurrent="1" nextAc="seek">
+              <p:cTn id="2" dur="indefinite" nodeType="mainSeq">
+                <p:childTnLst>
+                  <p:par>
+                    <p:cTn id="3" fill="hold">
+                      <p:stCondLst>
+                        <p:cond delay="indefinite"/>
+                      </p:stCondLst>
+                      <p:childTnLst>
+                        <p:par>
+                          <p:cTn id="4" fill="hold">
+                            <p:stCondLst>
+                              <p:cond delay="0"/>
+                            </p:stCondLst>
+                            <p:childTnLst>
+                              <p:par>
+                                <p:cTn id="5" presetID="22" presetClass="entr" presetSubtype="4" fill="hold" nodeType="clickEffect">
+                                  <p:stCondLst>
+                                    <p:cond delay="0"/>
+                                  </p:stCondLst>
+                                  <p:childTnLst>
+                                    <p:set>
+                                      <p:cBhvr>
+                                        <p:cTn id="6" dur="1" fill="hold">
+                                          <p:stCondLst>
+                                            <p:cond delay="0"/>
+                                          </p:stCondLst>
+                                        </p:cTn>
+                                        <p:tgtEl>
+                                          <p:spTgt spid="7"/>
+                                        </p:tgtEl>
+                                        <p:attrNameLst>
+                                          <p:attrName>style.visibility</p:attrName>
+                                        </p:attrNameLst>
+                                      </p:cBhvr>
+                                      <p:to>
+                                        <p:strVal val="visible"/>
+                                      </p:to>
+                                    </p:set>
+                                    <p:animEffect transition="in" filter="wipe(down)">
+                                      <p:cBhvr>
+                                        <p:cTn id="7" dur="500"/>
+                                        <p:tgtEl>
+                                          <p:spTgt spid="7"/>
+                                        </p:tgtEl>
+                                      </p:cBhvr>
+                                    </p:animEffect>
+                                  </p:childTnLst>
+                                </p:cTn>
+                              </p:par>
+                            </p:childTnLst>
+                          </p:cTn>
+                        </p:par>
+                      </p:childTnLst>
+                    </p:cTn>
+                  </p:par>
+                  <p:par>
+                    <p:cTn id="8" fill="hold">
+                      <p:stCondLst>
+                        <p:cond delay="indefinite"/>
+                      </p:stCondLst>
+                      <p:childTnLst>
+                        <p:par>
+                          <p:cTn id="9" fill="hold">
+                            <p:stCondLst>
+                              <p:cond delay="0"/>
+                            </p:stCondLst>
+                            <p:childTnLst>
+                              <p:par>
+                                <p:cTn id="10" presetID="10" presetClass="entr" presetSubtype="0" fill="hold" grpId="0" nodeType="clickEffect">
+                                  <p:stCondLst>
+                                    <p:cond delay="0"/>
+                                  </p:stCondLst>
+                                  <p:childTnLst>
+                                    <p:set>
+                                      <p:cBhvr>
+                                        <p:cTn id="11" dur="1" fill="hold">
+                                          <p:stCondLst>
+                                            <p:cond delay="0"/>
+                                          </p:stCondLst>
+                                        </p:cTn>
+                                        <p:tgtEl>
+                                          <p:spTgt spid="8"/>
+                                        </p:tgtEl>
+                                        <p:attrNameLst>
+                                          <p:attrName>style.visibility</p:attrName>
+                                        </p:attrNameLst>
+                                      </p:cBhvr>
+                                      <p:to>
+                                        <p:strVal val="visible"/>
+                                      </p:to>
+                                    </p:set>
+                                    <p:animEffect transition="in" filter="fade">
+                                      <p:cBhvr>
+                                        <p:cTn id="12" dur="500"/>
+                                        <p:tgtEl>
+                                          <p:spTgt spid="8"/>
+                                        </p:tgtEl>
+                                      </p:cBhvr>
+                                    </p:animEffect>
+                                  </p:childTnLst>
+                                </p:cTn>
+                              </p:par>
+                            </p:childTnLst>
+                          </p:cTn>
+                        </p:par>
+                      </p:childTnLst>
+                    </p:cTn>
+                  </p:par>
+                  <p:par>
+                    <p:cTn id="13" fill="hold">
+                      <p:stCondLst>
+                        <p:cond delay="indefinite"/>
+                      </p:stCondLst>
+                      <p:childTnLst>
+                        <p:par>
+                          <p:cTn id="14" fill="hold">
+                            <p:stCondLst>
+                              <p:cond delay="0"/>
+                            </p:stCondLst>
+                            <p:childTnLst>
+                              <p:par>
+                                <p:cTn id="15" presetID="22" presetClass="entr" presetSubtype="4" fill="hold" nodeType="clickEffect">
+                                  <p:stCondLst>
+                                    <p:cond delay="0"/>
+                                  </p:stCondLst>
+                                  <p:childTnLst>
+                                    <p:set>
+                                      <p:cBhvr>
+                                        <p:cTn id="16" dur="1" fill="hold">
+                                          <p:stCondLst>
+                                            <p:cond delay="0"/>
+                                          </p:stCondLst>
+                                        </p:cTn>
+                                        <p:tgtEl>
+                                          <p:spTgt spid="13"/>
+                                        </p:tgtEl>
+                                        <p:attrNameLst>
+                                          <p:attrName>style.visibility</p:attrName>
+                                        </p:attrNameLst>
+                                      </p:cBhvr>
+                                      <p:to>
+                                        <p:strVal val="visible"/>
+                                      </p:to>
+                                    </p:set>
+                                    <p:animEffect transition="in" filter="wipe(down)">
+                                      <p:cBhvr>
+                                        <p:cTn id="17" dur="500"/>
+                                        <p:tgtEl>
+                                          <p:spTgt spid="13"/>
+                                        </p:tgtEl>
+                                      </p:cBhvr>
+                                    </p:animEffect>
+                                  </p:childTnLst>
+                                </p:cTn>
+                              </p:par>
+                            </p:childTnLst>
+                          </p:cTn>
+                        </p:par>
+                      </p:childTnLst>
+                    </p:cTn>
+                  </p:par>
+                  <p:par>
+                    <p:cTn id="18" fill="hold">
+                      <p:stCondLst>
+                        <p:cond delay="indefinite"/>
+                      </p:stCondLst>
+                      <p:childTnLst>
+                        <p:par>
+                          <p:cTn id="19" fill="hold">
+                            <p:stCondLst>
+                              <p:cond delay="0"/>
+                            </p:stCondLst>
+                            <p:childTnLst>
+                              <p:par>
+                                <p:cTn id="20" presetID="10" presetClass="entr" presetSubtype="0" fill="hold" grpId="0" nodeType="clickEffect">
+                                  <p:stCondLst>
+                                    <p:cond delay="0"/>
+                                  </p:stCondLst>
+                                  <p:childTnLst>
+                                    <p:set>
+                                      <p:cBhvr>
+                                        <p:cTn id="21" dur="1" fill="hold">
+                                          <p:stCondLst>
+                                            <p:cond delay="0"/>
+                                          </p:stCondLst>
+                                        </p:cTn>
+                                        <p:tgtEl>
+                                          <p:spTgt spid="15"/>
+                                        </p:tgtEl>
+                                        <p:attrNameLst>
+                                          <p:attrName>style.visibility</p:attrName>
+                                        </p:attrNameLst>
+                                      </p:cBhvr>
+                                      <p:to>
+                                        <p:strVal val="visible"/>
+                                      </p:to>
+                                    </p:set>
+                                    <p:animEffect transition="in" filter="fade">
+                                      <p:cBhvr>
+                                        <p:cTn id="22" dur="500"/>
+                                        <p:tgtEl>
+                                          <p:spTgt spid="15"/>
+                                        </p:tgtEl>
+                                      </p:cBhvr>
+                                    </p:animEffect>
+                                  </p:childTnLst>
+                                </p:cTn>
+                              </p:par>
+                            </p:childTnLst>
+                          </p:cTn>
+                        </p:par>
+                      </p:childTnLst>
+                    </p:cTn>
+                  </p:par>
+                </p:childTnLst>
+              </p:cTn>
+              <p:prevCondLst>
+                <p:cond evt="onPrev" delay="0">
+                  <p:tgtEl>
+                    <p:sldTgt/>
+                  </p:tgtEl>
+                </p:cond>
+              </p:prevCondLst>
+              <p:nextCondLst>
+                <p:cond evt="onNext" delay="0">
+                  <p:tgtEl>
+                    <p:sldTgt/>
+                  </p:tgtEl>
+                </p:cond>
+              </p:nextCondLst>
+            </p:seq>
+          </p:childTnLst>
+        </p:cTn>
+      </p:par>
+    </p:tnLst>
+    <p:bldLst>
+      <p:bldP spid="8" grpId="0"/>
+      <p:bldP spid="15" grpId="0"/>
+    </p:bldLst>
+  </p:timing>
+</p:sld>
+</file>
+
+<file path=ppt/slides/slide14.xml><?xml version="1.0" encoding="utf-8"?>
+<p:sld xmlns:a="http://schemas.openxmlformats.org/drawingml/2006/main" xmlns:r="http://schemas.openxmlformats.org/officeDocument/2006/relationships" xmlns:p="http://schemas.openxmlformats.org/presentationml/2006/main">
+  <p:cSld>
+    <p:spTree>
+      <p:nvGrpSpPr>
+        <p:cNvPr id="1" name=""/>
+        <p:cNvGrpSpPr/>
+        <p:nvPr/>
+      </p:nvGrpSpPr>
+      <p:grpSpPr>
+        <a:xfrm>
+          <a:off x="0" y="0"/>
+          <a:ext cx="0" cy="0"/>
+          <a:chOff x="0" y="0"/>
+          <a:chExt cx="0" cy="0"/>
+        </a:xfrm>
+      </p:grpSpPr>
+      <p:sp>
+        <p:nvSpPr>
+          <p:cNvPr id="2" name="Titolo 1">
+            <a:extLst>
+              <a:ext uri="{FF2B5EF4-FFF2-40B4-BE49-F238E27FC236}">
+                <a16:creationId xmlns:a16="http://schemas.microsoft.com/office/drawing/2014/main" id="{23FD0A0B-34B0-4A42-A47B-17B8F7329B5A}"/>
+              </a:ext>
+            </a:extLst>
+          </p:cNvPr>
+          <p:cNvSpPr>
+            <a:spLocks noGrp="1"/>
+          </p:cNvSpPr>
+          <p:nvPr>
+            <p:ph type="title"/>
+          </p:nvPr>
+        </p:nvSpPr>
+        <p:spPr>
+          <a:xfrm>
+            <a:off x="765025" y="279076"/>
+            <a:ext cx="9612971" cy="1219272"/>
+          </a:xfrm>
+        </p:spPr>
+        <p:txBody>
+          <a:bodyPr>
+            <a:normAutofit fontScale="90000"/>
+          </a:bodyPr>
+          <a:lstStyle/>
+          <a:p>
+            <a:pPr algn="l"/>
+            <a:r>
+              <a:rPr lang="it-IT" dirty="0"/>
+              <a:t>Finestra di conferma </a:t>
+            </a:r>
+          </a:p>
+        </p:txBody>
+      </p:sp>
+      <p:pic>
+        <p:nvPicPr>
+          <p:cNvPr id="5" name="Immagine 4">
+            <a:extLst>
+              <a:ext uri="{FF2B5EF4-FFF2-40B4-BE49-F238E27FC236}">
+                <a16:creationId xmlns:a16="http://schemas.microsoft.com/office/drawing/2014/main" id="{A15A3407-AB58-4974-80ED-29D424CFA777}"/>
+              </a:ext>
+            </a:extLst>
+          </p:cNvPr>
+          <p:cNvPicPr>
+            <a:picLocks noChangeAspect="1"/>
+          </p:cNvPicPr>
+          <p:nvPr/>
+        </p:nvPicPr>
+        <p:blipFill>
+          <a:blip r:embed="rId2"/>
+          <a:stretch>
+            <a:fillRect/>
+          </a:stretch>
+        </p:blipFill>
+        <p:spPr>
+          <a:xfrm>
+            <a:off x="4112191" y="1927793"/>
+            <a:ext cx="3578929" cy="3510758"/>
+          </a:xfrm>
+          <a:prstGeom prst="rect">
+            <a:avLst/>
+          </a:prstGeom>
+        </p:spPr>
+      </p:pic>
+      <p:cxnSp>
+        <p:nvCxnSpPr>
+          <p:cNvPr id="7" name="Connettore a gomito 6">
+            <a:extLst>
+              <a:ext uri="{FF2B5EF4-FFF2-40B4-BE49-F238E27FC236}">
+                <a16:creationId xmlns:a16="http://schemas.microsoft.com/office/drawing/2014/main" id="{97EF0C2F-6613-495E-9FD1-274C25734506}"/>
+              </a:ext>
+            </a:extLst>
+          </p:cNvPr>
+          <p:cNvCxnSpPr/>
+          <p:nvPr/>
+        </p:nvCxnSpPr>
+        <p:spPr>
+          <a:xfrm rot="10800000">
+            <a:off x="2783840" y="1927794"/>
+            <a:ext cx="2123440" cy="774767"/>
+          </a:xfrm>
+          <a:prstGeom prst="bentConnector3">
+            <a:avLst/>
+          </a:prstGeom>
+          <a:ln>
+            <a:tailEnd type="triangle"/>
+          </a:ln>
+        </p:spPr>
+        <p:style>
+          <a:lnRef idx="2">
+            <a:schemeClr val="accent2"/>
+          </a:lnRef>
+          <a:fillRef idx="0">
+            <a:schemeClr val="accent2"/>
+          </a:fillRef>
+          <a:effectRef idx="1">
+            <a:schemeClr val="accent2"/>
+          </a:effectRef>
+          <a:fontRef idx="minor">
+            <a:schemeClr val="tx1"/>
+          </a:fontRef>
+        </p:style>
+      </p:cxnSp>
+      <p:sp>
+        <p:nvSpPr>
+          <p:cNvPr id="8" name="CasellaDiTesto 7">
+            <a:extLst>
+              <a:ext uri="{FF2B5EF4-FFF2-40B4-BE49-F238E27FC236}">
+                <a16:creationId xmlns:a16="http://schemas.microsoft.com/office/drawing/2014/main" id="{5BB1BB2B-127E-4A27-B295-D3B9E402F48C}"/>
+              </a:ext>
+            </a:extLst>
+          </p:cNvPr>
+          <p:cNvSpPr txBox="1"/>
+          <p:nvPr/>
+        </p:nvSpPr>
+        <p:spPr>
+          <a:xfrm>
+            <a:off x="894081" y="1594566"/>
+            <a:ext cx="1889759" cy="1107996"/>
+          </a:xfrm>
+          <a:prstGeom prst="rect">
+            <a:avLst/>
+          </a:prstGeom>
+          <a:noFill/>
+        </p:spPr>
+        <p:txBody>
+          <a:bodyPr wrap="square" rtlCol="0">
+            <a:spAutoFit/>
+          </a:bodyPr>
+          <a:lstStyle/>
+          <a:p>
+            <a:r>
+              <a:rPr lang="it-IT" sz="1600" b="1" dirty="0">
+                <a:highlight>
+                  <a:srgbClr val="000000"/>
+                </a:highlight>
+                <a:latin typeface="Bahnschrift Light Condensed" panose="020B0502040204020203" pitchFamily="34" charset="0"/>
+              </a:rPr>
+              <a:t>In questo spazio verrà visualizzato il computer da eliminare</a:t>
+            </a:r>
+          </a:p>
+          <a:p>
+            <a:endParaRPr lang="it-IT" dirty="0"/>
+          </a:p>
+        </p:txBody>
+      </p:sp>
+      <p:cxnSp>
+        <p:nvCxnSpPr>
+          <p:cNvPr id="10" name="Connettore a gomito 9">
+            <a:extLst>
+              <a:ext uri="{FF2B5EF4-FFF2-40B4-BE49-F238E27FC236}">
+                <a16:creationId xmlns:a16="http://schemas.microsoft.com/office/drawing/2014/main" id="{05258F4A-AD11-4494-A018-FA1CBB455A5D}"/>
+              </a:ext>
+            </a:extLst>
+          </p:cNvPr>
+          <p:cNvCxnSpPr/>
+          <p:nvPr/>
+        </p:nvCxnSpPr>
+        <p:spPr>
+          <a:xfrm flipV="1">
+            <a:off x="6776720" y="2621280"/>
+            <a:ext cx="1584960" cy="1061892"/>
+          </a:xfrm>
+          <a:prstGeom prst="bentConnector3">
+            <a:avLst/>
+          </a:prstGeom>
+          <a:ln>
+            <a:tailEnd type="triangle"/>
+          </a:ln>
+        </p:spPr>
+        <p:style>
+          <a:lnRef idx="2">
+            <a:schemeClr val="accent2"/>
+          </a:lnRef>
+          <a:fillRef idx="0">
+            <a:schemeClr val="accent2"/>
+          </a:fillRef>
+          <a:effectRef idx="1">
+            <a:schemeClr val="accent2"/>
+          </a:effectRef>
+          <a:fontRef idx="minor">
+            <a:schemeClr val="tx1"/>
+          </a:fontRef>
+        </p:style>
+      </p:cxnSp>
+      <p:sp>
+        <p:nvSpPr>
+          <p:cNvPr id="11" name="CasellaDiTesto 10">
+            <a:extLst>
+              <a:ext uri="{FF2B5EF4-FFF2-40B4-BE49-F238E27FC236}">
+                <a16:creationId xmlns:a16="http://schemas.microsoft.com/office/drawing/2014/main" id="{5EBF4C9E-BC92-4C3C-8858-17EA521FDAD7}"/>
+              </a:ext>
+            </a:extLst>
+          </p:cNvPr>
+          <p:cNvSpPr txBox="1"/>
+          <p:nvPr/>
+        </p:nvSpPr>
+        <p:spPr>
+          <a:xfrm>
+            <a:off x="8493760" y="2519680"/>
+            <a:ext cx="2339409" cy="1477328"/>
+          </a:xfrm>
+          <a:prstGeom prst="rect">
+            <a:avLst/>
+          </a:prstGeom>
+          <a:noFill/>
+        </p:spPr>
+        <p:txBody>
+          <a:bodyPr wrap="square" rtlCol="0">
+            <a:spAutoFit/>
+          </a:bodyPr>
+          <a:lstStyle/>
+          <a:p>
+            <a:r>
+              <a:rPr lang="it-IT" b="1" dirty="0">
+                <a:highlight>
+                  <a:srgbClr val="000000"/>
+                </a:highlight>
+                <a:latin typeface="Bahnschrift Light Condensed" panose="020B0502040204020203" pitchFamily="34" charset="0"/>
+              </a:rPr>
+              <a:t>Elimina solo la corrispondenza del pc ad un aula o ad un prof. Nel caso il pc non fosse assegnato il pulsante sarà disattivato </a:t>
+            </a:r>
+          </a:p>
+        </p:txBody>
+      </p:sp>
+      <p:cxnSp>
+        <p:nvCxnSpPr>
+          <p:cNvPr id="13" name="Connettore a gomito 12">
+            <a:extLst>
+              <a:ext uri="{FF2B5EF4-FFF2-40B4-BE49-F238E27FC236}">
+                <a16:creationId xmlns:a16="http://schemas.microsoft.com/office/drawing/2014/main" id="{AA1B9F1A-8D21-4DA5-A87D-CD161424506D}"/>
+              </a:ext>
+            </a:extLst>
+          </p:cNvPr>
+          <p:cNvCxnSpPr/>
+          <p:nvPr/>
+        </p:nvCxnSpPr>
+        <p:spPr>
+          <a:xfrm rot="10800000">
+            <a:off x="2915920" y="3429000"/>
+            <a:ext cx="2123440" cy="929640"/>
+          </a:xfrm>
+          <a:prstGeom prst="bentConnector3">
+            <a:avLst/>
+          </a:prstGeom>
+          <a:ln>
+            <a:tailEnd type="triangle"/>
+          </a:ln>
+        </p:spPr>
+        <p:style>
+          <a:lnRef idx="2">
+            <a:schemeClr val="accent2"/>
+          </a:lnRef>
+          <a:fillRef idx="0">
+            <a:schemeClr val="accent2"/>
+          </a:fillRef>
+          <a:effectRef idx="1">
+            <a:schemeClr val="accent2"/>
+          </a:effectRef>
+          <a:fontRef idx="minor">
+            <a:schemeClr val="tx1"/>
+          </a:fontRef>
+        </p:style>
+      </p:cxnSp>
+      <p:sp>
+        <p:nvSpPr>
+          <p:cNvPr id="14" name="CasellaDiTesto 13">
+            <a:extLst>
+              <a:ext uri="{FF2B5EF4-FFF2-40B4-BE49-F238E27FC236}">
+                <a16:creationId xmlns:a16="http://schemas.microsoft.com/office/drawing/2014/main" id="{B98EA47F-D2BF-455E-8681-74255819AE6A}"/>
+              </a:ext>
+            </a:extLst>
+          </p:cNvPr>
+          <p:cNvSpPr txBox="1"/>
+          <p:nvPr/>
+        </p:nvSpPr>
+        <p:spPr>
+          <a:xfrm>
+            <a:off x="765025" y="3253264"/>
+            <a:ext cx="2334191" cy="1200329"/>
+          </a:xfrm>
+          <a:prstGeom prst="rect">
+            <a:avLst/>
+          </a:prstGeom>
+          <a:noFill/>
+        </p:spPr>
+        <p:txBody>
+          <a:bodyPr wrap="square" rtlCol="0">
+            <a:spAutoFit/>
+          </a:bodyPr>
+          <a:lstStyle/>
+          <a:p>
+            <a:r>
+              <a:rPr lang="it-IT" b="1" dirty="0">
+                <a:highlight>
+                  <a:srgbClr val="000000"/>
+                </a:highlight>
+                <a:latin typeface="Bahnschrift Light Condensed" panose="020B0502040204020203" pitchFamily="34" charset="0"/>
+              </a:rPr>
+              <a:t>Elimina completamente il pc e la sua eventuale corrispondenza dal database</a:t>
+            </a:r>
+          </a:p>
+        </p:txBody>
+      </p:sp>
+    </p:spTree>
+    <p:extLst>
+      <p:ext uri="{BB962C8B-B14F-4D97-AF65-F5344CB8AC3E}">
+        <p14:creationId xmlns:p14="http://schemas.microsoft.com/office/powerpoint/2010/main" val="247307311"/>
+      </p:ext>
+    </p:extLst>
+  </p:cSld>
+  <p:clrMapOvr>
+    <a:masterClrMapping/>
+  </p:clrMapOvr>
+  <p:timing>
+    <p:tnLst>
+      <p:par>
+        <p:cTn id="1" dur="indefinite" restart="never" nodeType="tmRoot">
+          <p:childTnLst>
+            <p:seq concurrent="1" nextAc="seek">
+              <p:cTn id="2" dur="indefinite" nodeType="mainSeq">
+                <p:childTnLst>
+                  <p:par>
+                    <p:cTn id="3" fill="hold">
+                      <p:stCondLst>
+                        <p:cond delay="indefinite"/>
+                      </p:stCondLst>
+                      <p:childTnLst>
+                        <p:par>
+                          <p:cTn id="4" fill="hold">
+                            <p:stCondLst>
+                              <p:cond delay="0"/>
+                            </p:stCondLst>
+                            <p:childTnLst>
+                              <p:par>
+                                <p:cTn id="5" presetID="22" presetClass="entr" presetSubtype="4" fill="hold" nodeType="clickEffect">
+                                  <p:stCondLst>
+                                    <p:cond delay="0"/>
+                                  </p:stCondLst>
+                                  <p:childTnLst>
+                                    <p:set>
+                                      <p:cBhvr>
+                                        <p:cTn id="6" dur="1" fill="hold">
+                                          <p:stCondLst>
+                                            <p:cond delay="0"/>
+                                          </p:stCondLst>
+                                        </p:cTn>
+                                        <p:tgtEl>
+                                          <p:spTgt spid="7"/>
+                                        </p:tgtEl>
+                                        <p:attrNameLst>
+                                          <p:attrName>style.visibility</p:attrName>
+                                        </p:attrNameLst>
+                                      </p:cBhvr>
+                                      <p:to>
+                                        <p:strVal val="visible"/>
+                                      </p:to>
+                                    </p:set>
+                                    <p:animEffect transition="in" filter="wipe(down)">
+                                      <p:cBhvr>
+                                        <p:cTn id="7" dur="500"/>
+                                        <p:tgtEl>
+                                          <p:spTgt spid="7"/>
+                                        </p:tgtEl>
+                                      </p:cBhvr>
+                                    </p:animEffect>
+                                  </p:childTnLst>
+                                </p:cTn>
+                              </p:par>
+                            </p:childTnLst>
+                          </p:cTn>
+                        </p:par>
+                      </p:childTnLst>
+                    </p:cTn>
+                  </p:par>
+                  <p:par>
+                    <p:cTn id="8" fill="hold">
+                      <p:stCondLst>
+                        <p:cond delay="indefinite"/>
+                      </p:stCondLst>
+                      <p:childTnLst>
+                        <p:par>
+                          <p:cTn id="9" fill="hold">
+                            <p:stCondLst>
+                              <p:cond delay="0"/>
+                            </p:stCondLst>
+                            <p:childTnLst>
+                              <p:par>
+                                <p:cTn id="10" presetID="10" presetClass="entr" presetSubtype="0" fill="hold" grpId="0" nodeType="clickEffect">
+                                  <p:stCondLst>
+                                    <p:cond delay="0"/>
+                                  </p:stCondLst>
+                                  <p:childTnLst>
+                                    <p:set>
+                                      <p:cBhvr>
+                                        <p:cTn id="11" dur="1" fill="hold">
+                                          <p:stCondLst>
+                                            <p:cond delay="0"/>
+                                          </p:stCondLst>
+                                        </p:cTn>
+                                        <p:tgtEl>
+                                          <p:spTgt spid="8"/>
+                                        </p:tgtEl>
+                                        <p:attrNameLst>
+                                          <p:attrName>style.visibility</p:attrName>
+                                        </p:attrNameLst>
+                                      </p:cBhvr>
+                                      <p:to>
+                                        <p:strVal val="visible"/>
+                                      </p:to>
+                                    </p:set>
+                                    <p:animEffect transition="in" filter="fade">
+                                      <p:cBhvr>
+                                        <p:cTn id="12" dur="500"/>
+                                        <p:tgtEl>
+                                          <p:spTgt spid="8"/>
+                                        </p:tgtEl>
+                                      </p:cBhvr>
+                                    </p:animEffect>
+                                  </p:childTnLst>
+                                </p:cTn>
+                              </p:par>
+                            </p:childTnLst>
+                          </p:cTn>
+                        </p:par>
+                      </p:childTnLst>
+                    </p:cTn>
+                  </p:par>
+                  <p:par>
+                    <p:cTn id="13" fill="hold">
+                      <p:stCondLst>
+                        <p:cond delay="indefinite"/>
+                      </p:stCondLst>
+                      <p:childTnLst>
+                        <p:par>
+                          <p:cTn id="14" fill="hold">
+                            <p:stCondLst>
+                              <p:cond delay="0"/>
+                            </p:stCondLst>
+                            <p:childTnLst>
+                              <p:par>
+                                <p:cTn id="15" presetID="22" presetClass="entr" presetSubtype="4" fill="hold" nodeType="clickEffect">
+                                  <p:stCondLst>
+                                    <p:cond delay="0"/>
+                                  </p:stCondLst>
+                                  <p:childTnLst>
+                                    <p:set>
+                                      <p:cBhvr>
+                                        <p:cTn id="16" dur="1" fill="hold">
+                                          <p:stCondLst>
+                                            <p:cond delay="0"/>
+                                          </p:stCondLst>
+                                        </p:cTn>
+                                        <p:tgtEl>
+                                          <p:spTgt spid="10"/>
+                                        </p:tgtEl>
+                                        <p:attrNameLst>
+                                          <p:attrName>style.visibility</p:attrName>
+                                        </p:attrNameLst>
+                                      </p:cBhvr>
+                                      <p:to>
+                                        <p:strVal val="visible"/>
+                                      </p:to>
+                                    </p:set>
+                                    <p:animEffect transition="in" filter="wipe(down)">
+                                      <p:cBhvr>
+                                        <p:cTn id="17" dur="500"/>
+                                        <p:tgtEl>
+                                          <p:spTgt spid="10"/>
+                                        </p:tgtEl>
+                                      </p:cBhvr>
+                                    </p:animEffect>
+                                  </p:childTnLst>
+                                </p:cTn>
+                              </p:par>
+                            </p:childTnLst>
+                          </p:cTn>
+                        </p:par>
+                      </p:childTnLst>
+                    </p:cTn>
+                  </p:par>
+                  <p:par>
+                    <p:cTn id="18" fill="hold">
+                      <p:stCondLst>
+                        <p:cond delay="indefinite"/>
+                      </p:stCondLst>
+                      <p:childTnLst>
+                        <p:par>
+                          <p:cTn id="19" fill="hold">
+                            <p:stCondLst>
+                              <p:cond delay="0"/>
+                            </p:stCondLst>
+                            <p:childTnLst>
+                              <p:par>
+                                <p:cTn id="20" presetID="10" presetClass="entr" presetSubtype="0" fill="hold" grpId="0" nodeType="clickEffect">
+                                  <p:stCondLst>
+                                    <p:cond delay="0"/>
+                                  </p:stCondLst>
+                                  <p:childTnLst>
+                                    <p:set>
+                                      <p:cBhvr>
+                                        <p:cTn id="21" dur="1" fill="hold">
+                                          <p:stCondLst>
+                                            <p:cond delay="0"/>
+                                          </p:stCondLst>
+                                        </p:cTn>
+                                        <p:tgtEl>
+                                          <p:spTgt spid="11"/>
+                                        </p:tgtEl>
+                                        <p:attrNameLst>
+                                          <p:attrName>style.visibility</p:attrName>
+                                        </p:attrNameLst>
+                                      </p:cBhvr>
+                                      <p:to>
+                                        <p:strVal val="visible"/>
+                                      </p:to>
+                                    </p:set>
+                                    <p:animEffect transition="in" filter="fade">
+                                      <p:cBhvr>
+                                        <p:cTn id="22" dur="500"/>
+                                        <p:tgtEl>
+                                          <p:spTgt spid="11"/>
+                                        </p:tgtEl>
+                                      </p:cBhvr>
+                                    </p:animEffect>
+                                  </p:childTnLst>
+                                </p:cTn>
+                              </p:par>
+                            </p:childTnLst>
+                          </p:cTn>
+                        </p:par>
+                      </p:childTnLst>
+                    </p:cTn>
+                  </p:par>
+                  <p:par>
+                    <p:cTn id="23" fill="hold">
+                      <p:stCondLst>
+                        <p:cond delay="indefinite"/>
+                      </p:stCondLst>
+                      <p:childTnLst>
+                        <p:par>
+                          <p:cTn id="24" fill="hold">
+                            <p:stCondLst>
+                              <p:cond delay="0"/>
+                            </p:stCondLst>
+                            <p:childTnLst>
+                              <p:par>
+                                <p:cTn id="25" presetID="22" presetClass="entr" presetSubtype="4" fill="hold" nodeType="clickEffect">
+                                  <p:stCondLst>
+                                    <p:cond delay="0"/>
+                                  </p:stCondLst>
+                                  <p:childTnLst>
+                                    <p:set>
+                                      <p:cBhvr>
+                                        <p:cTn id="26" dur="1" fill="hold">
+                                          <p:stCondLst>
+                                            <p:cond delay="0"/>
+                                          </p:stCondLst>
+                                        </p:cTn>
+                                        <p:tgtEl>
+                                          <p:spTgt spid="13"/>
+                                        </p:tgtEl>
+                                        <p:attrNameLst>
+                                          <p:attrName>style.visibility</p:attrName>
+                                        </p:attrNameLst>
+                                      </p:cBhvr>
+                                      <p:to>
+                                        <p:strVal val="visible"/>
+                                      </p:to>
+                                    </p:set>
+                                    <p:animEffect transition="in" filter="wipe(down)">
+                                      <p:cBhvr>
+                                        <p:cTn id="27" dur="500"/>
+                                        <p:tgtEl>
+                                          <p:spTgt spid="13"/>
+                                        </p:tgtEl>
+                                      </p:cBhvr>
+                                    </p:animEffect>
+                                  </p:childTnLst>
+                                </p:cTn>
+                              </p:par>
+                            </p:childTnLst>
+                          </p:cTn>
+                        </p:par>
+                      </p:childTnLst>
+                    </p:cTn>
+                  </p:par>
+                  <p:par>
+                    <p:cTn id="28" fill="hold">
+                      <p:stCondLst>
+                        <p:cond delay="indefinite"/>
+                      </p:stCondLst>
+                      <p:childTnLst>
+                        <p:par>
+                          <p:cTn id="29" fill="hold">
+                            <p:stCondLst>
+                              <p:cond delay="0"/>
+                            </p:stCondLst>
+                            <p:childTnLst>
+                              <p:par>
+                                <p:cTn id="30" presetID="10" presetClass="entr" presetSubtype="0" fill="hold" grpId="0" nodeType="clickEffect">
+                                  <p:stCondLst>
+                                    <p:cond delay="0"/>
+                                  </p:stCondLst>
+                                  <p:childTnLst>
+                                    <p:set>
+                                      <p:cBhvr>
+                                        <p:cTn id="31" dur="1" fill="hold">
+                                          <p:stCondLst>
+                                            <p:cond delay="0"/>
+                                          </p:stCondLst>
+                                        </p:cTn>
+                                        <p:tgtEl>
+                                          <p:spTgt spid="14"/>
+                                        </p:tgtEl>
+                                        <p:attrNameLst>
+                                          <p:attrName>style.visibility</p:attrName>
+                                        </p:attrNameLst>
+                                      </p:cBhvr>
+                                      <p:to>
+                                        <p:strVal val="visible"/>
+                                      </p:to>
+                                    </p:set>
+                                    <p:animEffect transition="in" filter="fade">
+                                      <p:cBhvr>
+                                        <p:cTn id="32" dur="500"/>
+                                        <p:tgtEl>
+                                          <p:spTgt spid="14"/>
+                                        </p:tgtEl>
+                                      </p:cBhvr>
+                                    </p:animEffect>
+                                  </p:childTnLst>
+                                </p:cTn>
+                              </p:par>
+                            </p:childTnLst>
+                          </p:cTn>
+                        </p:par>
+                      </p:childTnLst>
+                    </p:cTn>
+                  </p:par>
+                </p:childTnLst>
+              </p:cTn>
+              <p:prevCondLst>
+                <p:cond evt="onPrev" delay="0">
+                  <p:tgtEl>
+                    <p:sldTgt/>
+                  </p:tgtEl>
+                </p:cond>
+              </p:prevCondLst>
+              <p:nextCondLst>
+                <p:cond evt="onNext" delay="0">
+                  <p:tgtEl>
+                    <p:sldTgt/>
+                  </p:tgtEl>
+                </p:cond>
+              </p:nextCondLst>
+            </p:seq>
+          </p:childTnLst>
+        </p:cTn>
+      </p:par>
+    </p:tnLst>
+    <p:bldLst>
+      <p:bldP spid="8" grpId="0"/>
+      <p:bldP spid="11" grpId="0"/>
+      <p:bldP spid="14" grpId="0"/>
     </p:bldLst>
   </p:timing>
 </p:sld>

</xml_diff>

<commit_message>
Fine della presentazione PW
conclusione della presentazione power point

Co-Authored-By: Davide D'Assaro <82150997+Dadinhox@users.noreply.github.com>
Co-Authored-By: GabrieleGino <40965968+Gino0@users.noreply.github.com>
</commit_message>
<xml_diff>
--- a/DOCUMENTAZIONE/Presentazione GestioneProgetto.pptx
+++ b/DOCUMENTAZIONE/Presentazione GestioneProgetto.pptx
@@ -12,13 +12,15 @@
     <p:sldId id="260" r:id="rId6"/>
     <p:sldId id="264" r:id="rId7"/>
     <p:sldId id="265" r:id="rId8"/>
-    <p:sldId id="263" r:id="rId9"/>
-    <p:sldId id="267" r:id="rId10"/>
-    <p:sldId id="268" r:id="rId11"/>
-    <p:sldId id="269" r:id="rId12"/>
-    <p:sldId id="266" r:id="rId13"/>
-    <p:sldId id="270" r:id="rId14"/>
-    <p:sldId id="271" r:id="rId15"/>
+    <p:sldId id="272" r:id="rId9"/>
+    <p:sldId id="263" r:id="rId10"/>
+    <p:sldId id="267" r:id="rId11"/>
+    <p:sldId id="268" r:id="rId12"/>
+    <p:sldId id="269" r:id="rId13"/>
+    <p:sldId id="266" r:id="rId14"/>
+    <p:sldId id="270" r:id="rId15"/>
+    <p:sldId id="271" r:id="rId16"/>
+    <p:sldId id="273" r:id="rId17"/>
   </p:sldIdLst>
   <p:sldSz cx="12192000" cy="6858000"/>
   <p:notesSz cx="6858000" cy="9144000"/>
@@ -8238,7 +8240,7 @@
             <a:fld id="{87DE6118-2437-4B30-8E3C-4D2BE6020583}" type="datetimeFigureOut">
               <a:rPr lang="en-US" dirty="0"/>
               <a:pPr/>
-              <a:t>12/4/2021</a:t>
+              <a:t>12/6/2021</a:t>
             </a:fld>
             <a:endParaRPr lang="en-US" dirty="0"/>
           </a:p>
@@ -8564,7 +8566,7 @@
           <a:p>
             <a:fld id="{87DE6118-2437-4B30-8E3C-4D2BE6020583}" type="datetimeFigureOut">
               <a:rPr lang="en-US" dirty="0"/>
-              <a:t>12/4/2021</a:t>
+              <a:t>12/6/2021</a:t>
             </a:fld>
             <a:endParaRPr lang="en-US" dirty="0"/>
           </a:p>
@@ -8739,7 +8741,7 @@
           <a:p>
             <a:fld id="{87DE6118-2437-4B30-8E3C-4D2BE6020583}" type="datetimeFigureOut">
               <a:rPr lang="en-US" dirty="0"/>
-              <a:t>12/4/2021</a:t>
+              <a:t>12/6/2021</a:t>
             </a:fld>
             <a:endParaRPr lang="en-US" dirty="0"/>
           </a:p>
@@ -8904,7 +8906,7 @@
           <a:p>
             <a:fld id="{87DE6118-2437-4B30-8E3C-4D2BE6020583}" type="datetimeFigureOut">
               <a:rPr lang="en-US" dirty="0"/>
-              <a:t>12/4/2021</a:t>
+              <a:t>12/6/2021</a:t>
             </a:fld>
             <a:endParaRPr lang="en-US" dirty="0"/>
           </a:p>
@@ -9177,7 +9179,7 @@
             <a:fld id="{87DE6118-2437-4B30-8E3C-4D2BE6020583}" type="datetimeFigureOut">
               <a:rPr lang="en-US" dirty="0"/>
               <a:pPr/>
-              <a:t>12/4/2021</a:t>
+              <a:t>12/6/2021</a:t>
             </a:fld>
             <a:endParaRPr lang="en-US" dirty="0"/>
           </a:p>
@@ -9567,7 +9569,7 @@
           <a:p>
             <a:fld id="{87DE6118-2437-4B30-8E3C-4D2BE6020583}" type="datetimeFigureOut">
               <a:rPr lang="en-US" dirty="0"/>
-              <a:t>12/4/2021</a:t>
+              <a:t>12/6/2021</a:t>
             </a:fld>
             <a:endParaRPr lang="en-US" dirty="0"/>
           </a:p>
@@ -10039,7 +10041,7 @@
           <a:p>
             <a:fld id="{87DE6118-2437-4B30-8E3C-4D2BE6020583}" type="datetimeFigureOut">
               <a:rPr lang="en-US" dirty="0"/>
-              <a:t>12/4/2021</a:t>
+              <a:t>12/6/2021</a:t>
             </a:fld>
             <a:endParaRPr lang="en-US" dirty="0"/>
           </a:p>
@@ -10152,7 +10154,7 @@
           <a:p>
             <a:fld id="{87DE6118-2437-4B30-8E3C-4D2BE6020583}" type="datetimeFigureOut">
               <a:rPr lang="en-US" dirty="0"/>
-              <a:t>12/4/2021</a:t>
+              <a:t>12/6/2021</a:t>
             </a:fld>
             <a:endParaRPr lang="en-US" dirty="0"/>
           </a:p>
@@ -10242,7 +10244,7 @@
           <a:p>
             <a:fld id="{87DE6118-2437-4B30-8E3C-4D2BE6020583}" type="datetimeFigureOut">
               <a:rPr lang="en-US" dirty="0"/>
-              <a:t>12/4/2021</a:t>
+              <a:t>12/6/2021</a:t>
             </a:fld>
             <a:endParaRPr lang="en-US" dirty="0"/>
           </a:p>
@@ -10584,7 +10586,7 @@
             <a:fld id="{87DE6118-2437-4B30-8E3C-4D2BE6020583}" type="datetimeFigureOut">
               <a:rPr lang="en-US" dirty="0"/>
               <a:pPr/>
-              <a:t>12/4/2021</a:t>
+              <a:t>12/6/2021</a:t>
             </a:fld>
             <a:endParaRPr lang="en-US" dirty="0"/>
           </a:p>
@@ -10969,7 +10971,7 @@
             <a:fld id="{87DE6118-2437-4B30-8E3C-4D2BE6020583}" type="datetimeFigureOut">
               <a:rPr lang="en-US" dirty="0"/>
               <a:pPr/>
-              <a:t>12/4/2021</a:t>
+              <a:t>12/6/2021</a:t>
             </a:fld>
             <a:endParaRPr lang="en-US" dirty="0"/>
           </a:p>
@@ -11244,7 +11246,7 @@
             <a:fld id="{87DE6118-2437-4B30-8E3C-4D2BE6020583}" type="datetimeFigureOut">
               <a:rPr lang="en-US" dirty="0"/>
               <a:pPr/>
-              <a:t>12/4/2021</a:t>
+              <a:t>12/6/2021</a:t>
             </a:fld>
             <a:endParaRPr lang="en-US" dirty="0"/>
           </a:p>
@@ -11946,6 +11948,320 @@
           <p:cNvPr id="2" name="Titolo 1">
             <a:extLst>
               <a:ext uri="{FF2B5EF4-FFF2-40B4-BE49-F238E27FC236}">
+                <a16:creationId xmlns:a16="http://schemas.microsoft.com/office/drawing/2014/main" id="{0F3339BA-CDBF-4CDA-A1BF-902D7EDE430B}"/>
+              </a:ext>
+            </a:extLst>
+          </p:cNvPr>
+          <p:cNvSpPr>
+            <a:spLocks noGrp="1"/>
+          </p:cNvSpPr>
+          <p:nvPr>
+            <p:ph type="title"/>
+          </p:nvPr>
+        </p:nvSpPr>
+        <p:spPr>
+          <a:xfrm>
+            <a:off x="759030" y="419973"/>
+            <a:ext cx="10673940" cy="1143324"/>
+          </a:xfrm>
+        </p:spPr>
+        <p:txBody>
+          <a:bodyPr>
+            <a:normAutofit/>
+          </a:bodyPr>
+          <a:lstStyle/>
+          <a:p>
+            <a:pPr algn="l"/>
+            <a:r>
+              <a:rPr lang="it-IT" dirty="0"/>
+              <a:t>Registra in magazzino</a:t>
+            </a:r>
+          </a:p>
+        </p:txBody>
+      </p:sp>
+      <p:pic>
+        <p:nvPicPr>
+          <p:cNvPr id="4" name="Immagine 3">
+            <a:extLst>
+              <a:ext uri="{FF2B5EF4-FFF2-40B4-BE49-F238E27FC236}">
+                <a16:creationId xmlns:a16="http://schemas.microsoft.com/office/drawing/2014/main" id="{29E72D38-9AF8-4621-B471-C9C16E9D674C}"/>
+              </a:ext>
+            </a:extLst>
+          </p:cNvPr>
+          <p:cNvPicPr>
+            <a:picLocks noChangeAspect="1"/>
+          </p:cNvPicPr>
+          <p:nvPr/>
+        </p:nvPicPr>
+        <p:blipFill>
+          <a:blip r:embed="rId2"/>
+          <a:stretch>
+            <a:fillRect/>
+          </a:stretch>
+        </p:blipFill>
+        <p:spPr>
+          <a:xfrm>
+            <a:off x="2537012" y="1857375"/>
+            <a:ext cx="6602225" cy="3409600"/>
+          </a:xfrm>
+          <a:prstGeom prst="rect">
+            <a:avLst/>
+          </a:prstGeom>
+        </p:spPr>
+      </p:pic>
+      <p:cxnSp>
+        <p:nvCxnSpPr>
+          <p:cNvPr id="6" name="Connettore 2 5">
+            <a:extLst>
+              <a:ext uri="{FF2B5EF4-FFF2-40B4-BE49-F238E27FC236}">
+                <a16:creationId xmlns:a16="http://schemas.microsoft.com/office/drawing/2014/main" id="{03C31981-B432-48CF-A069-0C4AF1609FD2}"/>
+              </a:ext>
+            </a:extLst>
+          </p:cNvPr>
+          <p:cNvCxnSpPr/>
+          <p:nvPr/>
+        </p:nvCxnSpPr>
+        <p:spPr>
+          <a:xfrm>
+            <a:off x="5773271" y="4285129"/>
+            <a:ext cx="0" cy="349624"/>
+          </a:xfrm>
+          <a:prstGeom prst="straightConnector1">
+            <a:avLst/>
+          </a:prstGeom>
+          <a:ln>
+            <a:tailEnd type="triangle"/>
+          </a:ln>
+        </p:spPr>
+        <p:style>
+          <a:lnRef idx="2">
+            <a:schemeClr val="accent2"/>
+          </a:lnRef>
+          <a:fillRef idx="0">
+            <a:schemeClr val="accent2"/>
+          </a:fillRef>
+          <a:effectRef idx="1">
+            <a:schemeClr val="accent2"/>
+          </a:effectRef>
+          <a:fontRef idx="minor">
+            <a:schemeClr val="tx1"/>
+          </a:fontRef>
+        </p:style>
+      </p:cxnSp>
+      <p:sp>
+        <p:nvSpPr>
+          <p:cNvPr id="7" name="CasellaDiTesto 6">
+            <a:extLst>
+              <a:ext uri="{FF2B5EF4-FFF2-40B4-BE49-F238E27FC236}">
+                <a16:creationId xmlns:a16="http://schemas.microsoft.com/office/drawing/2014/main" id="{AB47FA97-0503-420C-AE83-67E4595E2925}"/>
+              </a:ext>
+            </a:extLst>
+          </p:cNvPr>
+          <p:cNvSpPr txBox="1"/>
+          <p:nvPr/>
+        </p:nvSpPr>
+        <p:spPr>
+          <a:xfrm>
+            <a:off x="4930591" y="4659756"/>
+            <a:ext cx="2079805" cy="923330"/>
+          </a:xfrm>
+          <a:prstGeom prst="rect">
+            <a:avLst/>
+          </a:prstGeom>
+          <a:noFill/>
+        </p:spPr>
+        <p:txBody>
+          <a:bodyPr wrap="square" rtlCol="0">
+            <a:spAutoFit/>
+          </a:bodyPr>
+          <a:lstStyle/>
+          <a:p>
+            <a:r>
+              <a:rPr lang="it-IT" b="1" dirty="0">
+                <a:highlight>
+                  <a:srgbClr val="000000"/>
+                </a:highlight>
+                <a:latin typeface="Bahnschrift Light Condensed" panose="020B0502040204020203" pitchFamily="34" charset="0"/>
+              </a:rPr>
+              <a:t>Il tasto si attiva quando tutti i campi sono compilati </a:t>
+            </a:r>
+          </a:p>
+        </p:txBody>
+      </p:sp>
+    </p:spTree>
+    <p:extLst>
+      <p:ext uri="{BB962C8B-B14F-4D97-AF65-F5344CB8AC3E}">
+        <p14:creationId xmlns:p14="http://schemas.microsoft.com/office/powerpoint/2010/main" val="3819869026"/>
+      </p:ext>
+    </p:extLst>
+  </p:cSld>
+  <p:clrMapOvr>
+    <a:masterClrMapping/>
+  </p:clrMapOvr>
+  <p:timing>
+    <p:tnLst>
+      <p:par>
+        <p:cTn id="1" dur="indefinite" restart="never" nodeType="tmRoot">
+          <p:childTnLst>
+            <p:seq concurrent="1" nextAc="seek">
+              <p:cTn id="2" dur="indefinite" nodeType="mainSeq">
+                <p:childTnLst>
+                  <p:par>
+                    <p:cTn id="3" fill="hold">
+                      <p:stCondLst>
+                        <p:cond delay="indefinite"/>
+                      </p:stCondLst>
+                      <p:childTnLst>
+                        <p:par>
+                          <p:cTn id="4" fill="hold">
+                            <p:stCondLst>
+                              <p:cond delay="0"/>
+                            </p:stCondLst>
+                            <p:childTnLst>
+                              <p:par>
+                                <p:cTn id="5" presetID="22" presetClass="entr" presetSubtype="4" fill="hold" nodeType="clickEffect">
+                                  <p:stCondLst>
+                                    <p:cond delay="0"/>
+                                  </p:stCondLst>
+                                  <p:childTnLst>
+                                    <p:set>
+                                      <p:cBhvr>
+                                        <p:cTn id="6" dur="1" fill="hold">
+                                          <p:stCondLst>
+                                            <p:cond delay="0"/>
+                                          </p:stCondLst>
+                                        </p:cTn>
+                                        <p:tgtEl>
+                                          <p:spTgt spid="6"/>
+                                        </p:tgtEl>
+                                        <p:attrNameLst>
+                                          <p:attrName>style.visibility</p:attrName>
+                                        </p:attrNameLst>
+                                      </p:cBhvr>
+                                      <p:to>
+                                        <p:strVal val="visible"/>
+                                      </p:to>
+                                    </p:set>
+                                    <p:animEffect transition="in" filter="wipe(down)">
+                                      <p:cBhvr>
+                                        <p:cTn id="7" dur="500"/>
+                                        <p:tgtEl>
+                                          <p:spTgt spid="6"/>
+                                        </p:tgtEl>
+                                      </p:cBhvr>
+                                    </p:animEffect>
+                                  </p:childTnLst>
+                                </p:cTn>
+                              </p:par>
+                            </p:childTnLst>
+                          </p:cTn>
+                        </p:par>
+                      </p:childTnLst>
+                    </p:cTn>
+                  </p:par>
+                  <p:par>
+                    <p:cTn id="8" fill="hold">
+                      <p:stCondLst>
+                        <p:cond delay="indefinite"/>
+                      </p:stCondLst>
+                      <p:childTnLst>
+                        <p:par>
+                          <p:cTn id="9" fill="hold">
+                            <p:stCondLst>
+                              <p:cond delay="0"/>
+                            </p:stCondLst>
+                            <p:childTnLst>
+                              <p:par>
+                                <p:cTn id="10" presetID="10" presetClass="entr" presetSubtype="0" fill="hold" grpId="0" nodeType="clickEffect">
+                                  <p:stCondLst>
+                                    <p:cond delay="0"/>
+                                  </p:stCondLst>
+                                  <p:childTnLst>
+                                    <p:set>
+                                      <p:cBhvr>
+                                        <p:cTn id="11" dur="1" fill="hold">
+                                          <p:stCondLst>
+                                            <p:cond delay="0"/>
+                                          </p:stCondLst>
+                                        </p:cTn>
+                                        <p:tgtEl>
+                                          <p:spTgt spid="7"/>
+                                        </p:tgtEl>
+                                        <p:attrNameLst>
+                                          <p:attrName>style.visibility</p:attrName>
+                                        </p:attrNameLst>
+                                      </p:cBhvr>
+                                      <p:to>
+                                        <p:strVal val="visible"/>
+                                      </p:to>
+                                    </p:set>
+                                    <p:animEffect transition="in" filter="fade">
+                                      <p:cBhvr>
+                                        <p:cTn id="12" dur="500"/>
+                                        <p:tgtEl>
+                                          <p:spTgt spid="7"/>
+                                        </p:tgtEl>
+                                      </p:cBhvr>
+                                    </p:animEffect>
+                                  </p:childTnLst>
+                                </p:cTn>
+                              </p:par>
+                            </p:childTnLst>
+                          </p:cTn>
+                        </p:par>
+                      </p:childTnLst>
+                    </p:cTn>
+                  </p:par>
+                </p:childTnLst>
+              </p:cTn>
+              <p:prevCondLst>
+                <p:cond evt="onPrev" delay="0">
+                  <p:tgtEl>
+                    <p:sldTgt/>
+                  </p:tgtEl>
+                </p:cond>
+              </p:prevCondLst>
+              <p:nextCondLst>
+                <p:cond evt="onNext" delay="0">
+                  <p:tgtEl>
+                    <p:sldTgt/>
+                  </p:tgtEl>
+                </p:cond>
+              </p:nextCondLst>
+            </p:seq>
+          </p:childTnLst>
+        </p:cTn>
+      </p:par>
+    </p:tnLst>
+    <p:bldLst>
+      <p:bldP spid="7" grpId="0"/>
+    </p:bldLst>
+  </p:timing>
+</p:sld>
+</file>
+
+<file path=ppt/slides/slide11.xml><?xml version="1.0" encoding="utf-8"?>
+<p:sld xmlns:a="http://schemas.openxmlformats.org/drawingml/2006/main" xmlns:r="http://schemas.openxmlformats.org/officeDocument/2006/relationships" xmlns:p="http://schemas.openxmlformats.org/presentationml/2006/main">
+  <p:cSld>
+    <p:spTree>
+      <p:nvGrpSpPr>
+        <p:cNvPr id="1" name=""/>
+        <p:cNvGrpSpPr/>
+        <p:nvPr/>
+      </p:nvGrpSpPr>
+      <p:grpSpPr>
+        <a:xfrm>
+          <a:off x="0" y="0"/>
+          <a:ext cx="0" cy="0"/>
+          <a:chOff x="0" y="0"/>
+          <a:chExt cx="0" cy="0"/>
+        </a:xfrm>
+      </p:grpSpPr>
+      <p:sp>
+        <p:nvSpPr>
+          <p:cNvPr id="2" name="Titolo 1">
+            <a:extLst>
+              <a:ext uri="{FF2B5EF4-FFF2-40B4-BE49-F238E27FC236}">
                 <a16:creationId xmlns:a16="http://schemas.microsoft.com/office/drawing/2014/main" id="{B16D0537-8A13-4A7B-BEE2-415E4A2D43E4}"/>
               </a:ext>
             </a:extLst>
@@ -12033,13 +12349,13 @@
         </p:spPr>
         <p:style>
           <a:lnRef idx="2">
-            <a:schemeClr val="dk1"/>
+            <a:schemeClr val="accent2"/>
           </a:lnRef>
           <a:fillRef idx="0">
-            <a:schemeClr val="dk1"/>
+            <a:schemeClr val="accent2"/>
           </a:fillRef>
           <a:effectRef idx="1">
-            <a:schemeClr val="dk1"/>
+            <a:schemeClr val="accent2"/>
           </a:effectRef>
           <a:fontRef idx="minor">
             <a:schemeClr val="tx1"/>
@@ -12442,7 +12758,7 @@
 </p:sld>
 </file>
 
-<file path=ppt/slides/slide11.xml><?xml version="1.0" encoding="utf-8"?>
+<file path=ppt/slides/slide12.xml><?xml version="1.0" encoding="utf-8"?>
 <p:sld xmlns:a="http://schemas.openxmlformats.org/drawingml/2006/main" xmlns:r="http://schemas.openxmlformats.org/officeDocument/2006/relationships" xmlns:p="http://schemas.openxmlformats.org/presentationml/2006/main">
   <p:cSld>
     <p:spTree>
@@ -12551,13 +12867,13 @@
         </p:spPr>
         <p:style>
           <a:lnRef idx="2">
-            <a:schemeClr val="dk1"/>
+            <a:schemeClr val="accent2"/>
           </a:lnRef>
           <a:fillRef idx="0">
-            <a:schemeClr val="dk1"/>
+            <a:schemeClr val="accent2"/>
           </a:fillRef>
           <a:effectRef idx="1">
-            <a:schemeClr val="dk1"/>
+            <a:schemeClr val="accent2"/>
           </a:effectRef>
           <a:fontRef idx="minor">
             <a:schemeClr val="tx1"/>
@@ -12697,13 +13013,13 @@
         </p:spPr>
         <p:style>
           <a:lnRef idx="2">
-            <a:schemeClr val="dk1"/>
+            <a:schemeClr val="accent2"/>
           </a:lnRef>
           <a:fillRef idx="0">
-            <a:schemeClr val="dk1"/>
+            <a:schemeClr val="accent2"/>
           </a:fillRef>
           <a:effectRef idx="1">
-            <a:schemeClr val="dk1"/>
+            <a:schemeClr val="accent2"/>
           </a:effectRef>
           <a:fontRef idx="minor">
             <a:schemeClr val="tx1"/>
@@ -13009,7 +13325,7 @@
 </p:sld>
 </file>
 
-<file path=ppt/slides/slide12.xml><?xml version="1.0" encoding="utf-8"?>
+<file path=ppt/slides/slide13.xml><?xml version="1.0" encoding="utf-8"?>
 <p:sld xmlns:a="http://schemas.openxmlformats.org/drawingml/2006/main" xmlns:r="http://schemas.openxmlformats.org/officeDocument/2006/relationships" xmlns:p="http://schemas.openxmlformats.org/presentationml/2006/main">
   <p:cSld>
     <p:spTree>
@@ -13113,13 +13429,13 @@
         </p:spPr>
         <p:style>
           <a:lnRef idx="2">
-            <a:schemeClr val="dk1"/>
+            <a:schemeClr val="accent2"/>
           </a:lnRef>
           <a:fillRef idx="0">
-            <a:schemeClr val="dk1"/>
+            <a:schemeClr val="accent2"/>
           </a:fillRef>
           <a:effectRef idx="1">
-            <a:schemeClr val="dk1"/>
+            <a:schemeClr val="accent2"/>
           </a:effectRef>
           <a:fontRef idx="minor">
             <a:schemeClr val="tx1"/>
@@ -13160,13 +13476,13 @@
         </p:spPr>
         <p:style>
           <a:lnRef idx="2">
-            <a:schemeClr val="dk1"/>
+            <a:schemeClr val="accent2"/>
           </a:lnRef>
           <a:fillRef idx="0">
-            <a:schemeClr val="dk1"/>
+            <a:schemeClr val="accent2"/>
           </a:fillRef>
           <a:effectRef idx="1">
-            <a:schemeClr val="dk1"/>
+            <a:schemeClr val="accent2"/>
           </a:effectRef>
           <a:fontRef idx="minor">
             <a:schemeClr val="tx1"/>
@@ -13696,13 +14012,13 @@
         </p:spPr>
         <p:style>
           <a:lnRef idx="2">
-            <a:schemeClr val="dk1"/>
+            <a:schemeClr val="accent2"/>
           </a:lnRef>
           <a:fillRef idx="0">
-            <a:schemeClr val="dk1"/>
+            <a:schemeClr val="accent2"/>
           </a:fillRef>
           <a:effectRef idx="1">
-            <a:schemeClr val="dk1"/>
+            <a:schemeClr val="accent2"/>
           </a:effectRef>
           <a:fontRef idx="minor">
             <a:schemeClr val="tx1"/>
@@ -13775,13 +14091,13 @@
         </p:spPr>
         <p:style>
           <a:lnRef idx="2">
-            <a:schemeClr val="dk1"/>
+            <a:schemeClr val="accent2"/>
           </a:lnRef>
           <a:fillRef idx="0">
-            <a:schemeClr val="dk1"/>
+            <a:schemeClr val="accent2"/>
           </a:fillRef>
           <a:effectRef idx="1">
-            <a:schemeClr val="dk1"/>
+            <a:schemeClr val="accent2"/>
           </a:effectRef>
           <a:fontRef idx="minor">
             <a:schemeClr val="tx1"/>
@@ -14356,7 +14672,7 @@
 </p:sld>
 </file>
 
-<file path=ppt/slides/slide13.xml><?xml version="1.0" encoding="utf-8"?>
+<file path=ppt/slides/slide14.xml><?xml version="1.0" encoding="utf-8"?>
 <p:sld xmlns:a="http://schemas.openxmlformats.org/drawingml/2006/main" xmlns:r="http://schemas.openxmlformats.org/officeDocument/2006/relationships" xmlns:p="http://schemas.openxmlformats.org/presentationml/2006/main">
   <p:cSld>
     <p:spTree>
@@ -14465,13 +14781,13 @@
         </p:spPr>
         <p:style>
           <a:lnRef idx="2">
-            <a:schemeClr val="dk1"/>
+            <a:schemeClr val="accent2"/>
           </a:lnRef>
           <a:fillRef idx="0">
-            <a:schemeClr val="dk1"/>
+            <a:schemeClr val="accent2"/>
           </a:fillRef>
           <a:effectRef idx="1">
-            <a:schemeClr val="dk1"/>
+            <a:schemeClr val="accent2"/>
           </a:effectRef>
           <a:fontRef idx="minor">
             <a:schemeClr val="tx1"/>
@@ -14544,13 +14860,13 @@
         </p:spPr>
         <p:style>
           <a:lnRef idx="2">
-            <a:schemeClr val="dk1"/>
+            <a:schemeClr val="accent2"/>
           </a:lnRef>
           <a:fillRef idx="0">
-            <a:schemeClr val="dk1"/>
+            <a:schemeClr val="accent2"/>
           </a:fillRef>
           <a:effectRef idx="1">
-            <a:schemeClr val="dk1"/>
+            <a:schemeClr val="accent2"/>
           </a:effectRef>
           <a:fontRef idx="minor">
             <a:schemeClr val="tx1"/>
@@ -14874,7 +15190,7 @@
 </p:sld>
 </file>
 
-<file path=ppt/slides/slide14.xml><?xml version="1.0" encoding="utf-8"?>
+<file path=ppt/slides/slide15.xml><?xml version="1.0" encoding="utf-8"?>
 <p:sld xmlns:a="http://schemas.openxmlformats.org/drawingml/2006/main" xmlns:r="http://schemas.openxmlformats.org/officeDocument/2006/relationships" xmlns:p="http://schemas.openxmlformats.org/presentationml/2006/main">
   <p:cSld>
     <p:spTree>
@@ -15563,6 +15879,102 @@
 </p:sld>
 </file>
 
+<file path=ppt/slides/slide16.xml><?xml version="1.0" encoding="utf-8"?>
+<p:sld xmlns:a="http://schemas.openxmlformats.org/drawingml/2006/main" xmlns:r="http://schemas.openxmlformats.org/officeDocument/2006/relationships" xmlns:p="http://schemas.openxmlformats.org/presentationml/2006/main">
+  <p:cSld>
+    <p:spTree>
+      <p:nvGrpSpPr>
+        <p:cNvPr id="1" name=""/>
+        <p:cNvGrpSpPr/>
+        <p:nvPr/>
+      </p:nvGrpSpPr>
+      <p:grpSpPr>
+        <a:xfrm>
+          <a:off x="0" y="0"/>
+          <a:ext cx="0" cy="0"/>
+          <a:chOff x="0" y="0"/>
+          <a:chExt cx="0" cy="0"/>
+        </a:xfrm>
+      </p:grpSpPr>
+      <p:sp>
+        <p:nvSpPr>
+          <p:cNvPr id="2" name="Titolo 1">
+            <a:extLst>
+              <a:ext uri="{FF2B5EF4-FFF2-40B4-BE49-F238E27FC236}">
+                <a16:creationId xmlns:a16="http://schemas.microsoft.com/office/drawing/2014/main" id="{69D53E83-7D4C-43D5-BE61-9CB9B915BA6E}"/>
+              </a:ext>
+            </a:extLst>
+          </p:cNvPr>
+          <p:cNvSpPr>
+            <a:spLocks noGrp="1"/>
+          </p:cNvSpPr>
+          <p:nvPr>
+            <p:ph type="ctrTitle"/>
+          </p:nvPr>
+        </p:nvSpPr>
+        <p:spPr>
+          <a:xfrm>
+            <a:off x="1915381" y="1869855"/>
+            <a:ext cx="8361229" cy="1554541"/>
+          </a:xfrm>
+        </p:spPr>
+        <p:txBody>
+          <a:bodyPr/>
+          <a:lstStyle/>
+          <a:p>
+            <a:r>
+              <a:rPr lang="it-IT" dirty="0"/>
+              <a:t>grazie</a:t>
+            </a:r>
+          </a:p>
+        </p:txBody>
+      </p:sp>
+      <p:sp>
+        <p:nvSpPr>
+          <p:cNvPr id="3" name="Sottotitolo 2">
+            <a:extLst>
+              <a:ext uri="{FF2B5EF4-FFF2-40B4-BE49-F238E27FC236}">
+                <a16:creationId xmlns:a16="http://schemas.microsoft.com/office/drawing/2014/main" id="{69F686B6-E68A-46A0-86FF-4C2B9E101718}"/>
+              </a:ext>
+            </a:extLst>
+          </p:cNvPr>
+          <p:cNvSpPr>
+            <a:spLocks noGrp="1"/>
+          </p:cNvSpPr>
+          <p:nvPr>
+            <p:ph type="subTitle" idx="1"/>
+          </p:nvPr>
+        </p:nvSpPr>
+        <p:spPr>
+          <a:xfrm>
+            <a:off x="2680160" y="3424396"/>
+            <a:ext cx="6831673" cy="1086237"/>
+          </a:xfrm>
+        </p:spPr>
+        <p:txBody>
+          <a:bodyPr/>
+          <a:lstStyle/>
+          <a:p>
+            <a:r>
+              <a:rPr lang="it-IT" dirty="0"/>
+              <a:t>A breve verrà inviata la fattura </a:t>
+            </a:r>
+          </a:p>
+        </p:txBody>
+      </p:sp>
+    </p:spTree>
+    <p:extLst>
+      <p:ext uri="{BB962C8B-B14F-4D97-AF65-F5344CB8AC3E}">
+        <p14:creationId xmlns:p14="http://schemas.microsoft.com/office/powerpoint/2010/main" val="1320681471"/>
+      </p:ext>
+    </p:extLst>
+  </p:cSld>
+  <p:clrMapOvr>
+    <a:masterClrMapping/>
+  </p:clrMapOvr>
+</p:sld>
+</file>
+
 <file path=ppt/slides/slide2.xml><?xml version="1.0" encoding="utf-8"?>
 <p:sld xmlns:a="http://schemas.openxmlformats.org/drawingml/2006/main" xmlns:r="http://schemas.openxmlformats.org/officeDocument/2006/relationships" xmlns:p="http://schemas.openxmlformats.org/presentationml/2006/main">
   <p:cSld>
@@ -15636,7 +16048,9 @@
           </a:xfrm>
         </p:spPr>
         <p:txBody>
-          <a:bodyPr/>
+          <a:bodyPr>
+            <a:normAutofit/>
+          </a:bodyPr>
           <a:lstStyle/>
           <a:p>
             <a:pPr marL="0" indent="0" algn="ctr">
@@ -15690,12 +16104,22 @@
           </a:xfrm>
         </p:spPr>
         <p:txBody>
-          <a:bodyPr/>
+          <a:bodyPr>
+            <a:normAutofit/>
+          </a:bodyPr>
           <a:lstStyle/>
           <a:p>
             <a:r>
               <a:rPr lang="it-IT" dirty="0"/>
-              <a:t>CEO: </a:t>
+              <a:t>CEO </a:t>
+            </a:r>
+            <a:r>
+              <a:rPr lang="it-IT" sz="1050" dirty="0"/>
+              <a:t>(amministratore delegato) </a:t>
+            </a:r>
+            <a:r>
+              <a:rPr lang="it-IT" dirty="0"/>
+              <a:t>: </a:t>
             </a:r>
             <a:r>
               <a:rPr lang="it-IT" sz="1200" dirty="0"/>
@@ -15705,7 +16129,15 @@
           <a:p>
             <a:r>
               <a:rPr lang="it-IT" dirty="0"/>
-              <a:t>Amministratore Delegato:  </a:t>
+              <a:t>CSO </a:t>
+            </a:r>
+            <a:r>
+              <a:rPr lang="it-IT" sz="1050" dirty="0"/>
+              <a:t>(direttore sicurezza) </a:t>
+            </a:r>
+            <a:r>
+              <a:rPr lang="it-IT" dirty="0"/>
+              <a:t>:  </a:t>
             </a:r>
             <a:r>
               <a:rPr lang="it-IT" sz="1200" dirty="0"/>
@@ -15715,7 +16147,19 @@
           <a:p>
             <a:r>
               <a:rPr lang="it-IT" dirty="0"/>
-              <a:t>CFO: </a:t>
+              <a:t>CFO </a:t>
+            </a:r>
+            <a:r>
+              <a:rPr lang="it-IT" sz="1050" dirty="0"/>
+              <a:t>(</a:t>
+            </a:r>
+            <a:r>
+              <a:rPr lang="it-IT" sz="1000" dirty="0"/>
+              <a:t>direttore finanziario)</a:t>
+            </a:r>
+            <a:r>
+              <a:rPr lang="it-IT" sz="1400" dirty="0"/>
+              <a:t>: </a:t>
             </a:r>
             <a:r>
               <a:rPr lang="it-IT" sz="1200" dirty="0"/>
@@ -15726,7 +16170,15 @@
           <a:p>
             <a:r>
               <a:rPr lang="it-IT" dirty="0"/>
-              <a:t>CMO: </a:t>
+              <a:t>CMO </a:t>
+            </a:r>
+            <a:r>
+              <a:rPr lang="it-IT" sz="1050" dirty="0"/>
+              <a:t>(comunicazione marketing)</a:t>
+            </a:r>
+            <a:r>
+              <a:rPr lang="it-IT" sz="1400" dirty="0"/>
+              <a:t> : </a:t>
             </a:r>
             <a:r>
               <a:rPr lang="it-IT" sz="1200" dirty="0"/>
@@ -15741,11 +16193,19 @@
           <a:p>
             <a:r>
               <a:rPr lang="it-IT" dirty="0"/>
-              <a:t>CTO:</a:t>
+              <a:t>CTO </a:t>
+            </a:r>
+            <a:r>
+              <a:rPr lang="it-IT" sz="1050" dirty="0"/>
+              <a:t>(direttore tecnico) </a:t>
+            </a:r>
+            <a:r>
+              <a:rPr lang="it-IT" dirty="0"/>
+              <a:t>:</a:t>
             </a:r>
             <a:r>
               <a:rPr lang="it-IT" sz="1200" dirty="0"/>
-              <a:t> Davide D’</a:t>
+              <a:t>  Mr. Davide D’</a:t>
             </a:r>
             <a:r>
               <a:rPr lang="it-IT" sz="1200" dirty="0" err="1"/>
@@ -17122,13 +17582,13 @@
         </p:spPr>
         <p:style>
           <a:lnRef idx="2">
-            <a:schemeClr val="dk1"/>
+            <a:schemeClr val="accent2"/>
           </a:lnRef>
           <a:fillRef idx="0">
-            <a:schemeClr val="dk1"/>
+            <a:schemeClr val="accent2"/>
           </a:fillRef>
           <a:effectRef idx="1">
-            <a:schemeClr val="dk1"/>
+            <a:schemeClr val="accent2"/>
           </a:effectRef>
           <a:fontRef idx="minor">
             <a:schemeClr val="tx1"/>
@@ -17346,6 +17806,638 @@
       </p:grpSpPr>
       <p:sp>
         <p:nvSpPr>
+          <p:cNvPr id="2" name="Titolo 1">
+            <a:extLst>
+              <a:ext uri="{FF2B5EF4-FFF2-40B4-BE49-F238E27FC236}">
+                <a16:creationId xmlns:a16="http://schemas.microsoft.com/office/drawing/2014/main" id="{C760D044-9B04-4B87-B6C1-E9A23B26AC7B}"/>
+              </a:ext>
+            </a:extLst>
+          </p:cNvPr>
+          <p:cNvSpPr>
+            <a:spLocks noGrp="1"/>
+          </p:cNvSpPr>
+          <p:nvPr>
+            <p:ph type="title"/>
+          </p:nvPr>
+        </p:nvSpPr>
+        <p:spPr>
+          <a:xfrm>
+            <a:off x="765025" y="435353"/>
+            <a:ext cx="9612971" cy="1143324"/>
+          </a:xfrm>
+        </p:spPr>
+        <p:txBody>
+          <a:bodyPr/>
+          <a:lstStyle/>
+          <a:p>
+            <a:pPr algn="l"/>
+            <a:r>
+              <a:rPr lang="it-IT" dirty="0"/>
+              <a:t>HOME</a:t>
+            </a:r>
+          </a:p>
+        </p:txBody>
+      </p:sp>
+      <p:pic>
+        <p:nvPicPr>
+          <p:cNvPr id="4" name="Immagine 3">
+            <a:extLst>
+              <a:ext uri="{FF2B5EF4-FFF2-40B4-BE49-F238E27FC236}">
+                <a16:creationId xmlns:a16="http://schemas.microsoft.com/office/drawing/2014/main" id="{978D9CF9-3F32-4853-BB2D-A186A72B4C48}"/>
+              </a:ext>
+            </a:extLst>
+          </p:cNvPr>
+          <p:cNvPicPr>
+            <a:picLocks noChangeAspect="1"/>
+          </p:cNvPicPr>
+          <p:nvPr/>
+        </p:nvPicPr>
+        <p:blipFill>
+          <a:blip r:embed="rId2"/>
+          <a:stretch>
+            <a:fillRect/>
+          </a:stretch>
+        </p:blipFill>
+        <p:spPr>
+          <a:xfrm>
+            <a:off x="2684478" y="1760551"/>
+            <a:ext cx="6556564" cy="3457283"/>
+          </a:xfrm>
+          <a:prstGeom prst="rect">
+            <a:avLst/>
+          </a:prstGeom>
+        </p:spPr>
+      </p:pic>
+      <p:sp>
+        <p:nvSpPr>
+          <p:cNvPr id="7" name="CasellaDiTesto 6">
+            <a:extLst>
+              <a:ext uri="{FF2B5EF4-FFF2-40B4-BE49-F238E27FC236}">
+                <a16:creationId xmlns:a16="http://schemas.microsoft.com/office/drawing/2014/main" id="{A7C165D4-969A-46D7-87C9-C0037C7E572A}"/>
+              </a:ext>
+            </a:extLst>
+          </p:cNvPr>
+          <p:cNvSpPr txBox="1"/>
+          <p:nvPr/>
+        </p:nvSpPr>
+        <p:spPr>
+          <a:xfrm>
+            <a:off x="286854" y="2565862"/>
+            <a:ext cx="1718116" cy="923330"/>
+          </a:xfrm>
+          <a:prstGeom prst="rect">
+            <a:avLst/>
+          </a:prstGeom>
+          <a:noFill/>
+        </p:spPr>
+        <p:txBody>
+          <a:bodyPr wrap="square" rtlCol="0">
+            <a:spAutoFit/>
+          </a:bodyPr>
+          <a:lstStyle/>
+          <a:p>
+            <a:r>
+              <a:rPr lang="it-IT" b="1" dirty="0">
+                <a:highlight>
+                  <a:srgbClr val="000000"/>
+                </a:highlight>
+                <a:latin typeface="Bahnschrift Light SemiCondensed" panose="020B0502040204020203" pitchFamily="34" charset="0"/>
+              </a:rPr>
+              <a:t>Il tasto indirizza alla schermata registra </a:t>
+            </a:r>
+          </a:p>
+        </p:txBody>
+      </p:sp>
+      <p:cxnSp>
+        <p:nvCxnSpPr>
+          <p:cNvPr id="9" name="Connettore a gomito 8">
+            <a:extLst>
+              <a:ext uri="{FF2B5EF4-FFF2-40B4-BE49-F238E27FC236}">
+                <a16:creationId xmlns:a16="http://schemas.microsoft.com/office/drawing/2014/main" id="{1E56BE31-F4F0-4718-92B9-B36E59CAFCC9}"/>
+              </a:ext>
+            </a:extLst>
+          </p:cNvPr>
+          <p:cNvCxnSpPr>
+            <a:endCxn id="7" idx="3"/>
+          </p:cNvCxnSpPr>
+          <p:nvPr/>
+        </p:nvCxnSpPr>
+        <p:spPr>
+          <a:xfrm rot="10800000">
+            <a:off x="2004970" y="3027528"/>
+            <a:ext cx="1300292" cy="461665"/>
+          </a:xfrm>
+          <a:prstGeom prst="bentConnector3">
+            <a:avLst/>
+          </a:prstGeom>
+          <a:ln>
+            <a:tailEnd type="triangle"/>
+          </a:ln>
+        </p:spPr>
+        <p:style>
+          <a:lnRef idx="2">
+            <a:schemeClr val="accent2"/>
+          </a:lnRef>
+          <a:fillRef idx="0">
+            <a:schemeClr val="accent2"/>
+          </a:fillRef>
+          <a:effectRef idx="1">
+            <a:schemeClr val="accent2"/>
+          </a:effectRef>
+          <a:fontRef idx="minor">
+            <a:schemeClr val="tx1"/>
+          </a:fontRef>
+        </p:style>
+      </p:cxnSp>
+      <p:cxnSp>
+        <p:nvCxnSpPr>
+          <p:cNvPr id="11" name="Connettore a gomito 10">
+            <a:extLst>
+              <a:ext uri="{FF2B5EF4-FFF2-40B4-BE49-F238E27FC236}">
+                <a16:creationId xmlns:a16="http://schemas.microsoft.com/office/drawing/2014/main" id="{90763549-E374-4B94-AC95-25D58E766D06}"/>
+              </a:ext>
+            </a:extLst>
+          </p:cNvPr>
+          <p:cNvCxnSpPr/>
+          <p:nvPr/>
+        </p:nvCxnSpPr>
+        <p:spPr>
+          <a:xfrm rot="5400000">
+            <a:off x="4998932" y="3910176"/>
+            <a:ext cx="1082180" cy="845476"/>
+          </a:xfrm>
+          <a:prstGeom prst="bentConnector3">
+            <a:avLst/>
+          </a:prstGeom>
+          <a:ln>
+            <a:tailEnd type="triangle"/>
+          </a:ln>
+        </p:spPr>
+        <p:style>
+          <a:lnRef idx="2">
+            <a:schemeClr val="accent2"/>
+          </a:lnRef>
+          <a:fillRef idx="0">
+            <a:schemeClr val="accent2"/>
+          </a:fillRef>
+          <a:effectRef idx="1">
+            <a:schemeClr val="accent2"/>
+          </a:effectRef>
+          <a:fontRef idx="minor">
+            <a:schemeClr val="tx1"/>
+          </a:fontRef>
+        </p:style>
+      </p:cxnSp>
+      <p:sp>
+        <p:nvSpPr>
+          <p:cNvPr id="12" name="CasellaDiTesto 11">
+            <a:extLst>
+              <a:ext uri="{FF2B5EF4-FFF2-40B4-BE49-F238E27FC236}">
+                <a16:creationId xmlns:a16="http://schemas.microsoft.com/office/drawing/2014/main" id="{AD4D1B42-9287-40D9-9867-F15F0763A420}"/>
+              </a:ext>
+            </a:extLst>
+          </p:cNvPr>
+          <p:cNvSpPr txBox="1"/>
+          <p:nvPr/>
+        </p:nvSpPr>
+        <p:spPr>
+          <a:xfrm>
+            <a:off x="4248117" y="4894668"/>
+            <a:ext cx="2583809" cy="646331"/>
+          </a:xfrm>
+          <a:prstGeom prst="rect">
+            <a:avLst/>
+          </a:prstGeom>
+          <a:noFill/>
+        </p:spPr>
+        <p:txBody>
+          <a:bodyPr wrap="square" rtlCol="0">
+            <a:spAutoFit/>
+          </a:bodyPr>
+          <a:lstStyle/>
+          <a:p>
+            <a:r>
+              <a:rPr lang="it-IT" b="1" dirty="0">
+                <a:highlight>
+                  <a:srgbClr val="000000"/>
+                </a:highlight>
+                <a:latin typeface="Bahnschrift Light SemiCondensed" panose="020B0502040204020203" pitchFamily="34" charset="0"/>
+              </a:rPr>
+              <a:t>Indirizza alla schermata ricerca e modifica</a:t>
+            </a:r>
+          </a:p>
+        </p:txBody>
+      </p:sp>
+      <p:cxnSp>
+        <p:nvCxnSpPr>
+          <p:cNvPr id="16" name="Connettore a gomito 15">
+            <a:extLst>
+              <a:ext uri="{FF2B5EF4-FFF2-40B4-BE49-F238E27FC236}">
+                <a16:creationId xmlns:a16="http://schemas.microsoft.com/office/drawing/2014/main" id="{C382C46B-46BC-447B-90A6-EEBCE9A4E84D}"/>
+              </a:ext>
+            </a:extLst>
+          </p:cNvPr>
+          <p:cNvCxnSpPr/>
+          <p:nvPr/>
+        </p:nvCxnSpPr>
+        <p:spPr>
+          <a:xfrm flipV="1">
+            <a:off x="8816829" y="2793534"/>
+            <a:ext cx="1015068" cy="695658"/>
+          </a:xfrm>
+          <a:prstGeom prst="bentConnector3">
+            <a:avLst/>
+          </a:prstGeom>
+          <a:ln>
+            <a:tailEnd type="triangle"/>
+          </a:ln>
+        </p:spPr>
+        <p:style>
+          <a:lnRef idx="2">
+            <a:schemeClr val="accent2"/>
+          </a:lnRef>
+          <a:fillRef idx="0">
+            <a:schemeClr val="accent2"/>
+          </a:fillRef>
+          <a:effectRef idx="1">
+            <a:schemeClr val="accent2"/>
+          </a:effectRef>
+          <a:fontRef idx="minor">
+            <a:schemeClr val="tx1"/>
+          </a:fontRef>
+        </p:style>
+      </p:cxnSp>
+      <p:sp>
+        <p:nvSpPr>
+          <p:cNvPr id="17" name="CasellaDiTesto 16">
+            <a:extLst>
+              <a:ext uri="{FF2B5EF4-FFF2-40B4-BE49-F238E27FC236}">
+                <a16:creationId xmlns:a16="http://schemas.microsoft.com/office/drawing/2014/main" id="{9B16151A-3C6C-4A3A-918C-58BA63054321}"/>
+              </a:ext>
+            </a:extLst>
+          </p:cNvPr>
+          <p:cNvSpPr txBox="1"/>
+          <p:nvPr/>
+        </p:nvSpPr>
+        <p:spPr>
+          <a:xfrm>
+            <a:off x="9742650" y="2505670"/>
+            <a:ext cx="1718115" cy="923330"/>
+          </a:xfrm>
+          <a:prstGeom prst="rect">
+            <a:avLst/>
+          </a:prstGeom>
+          <a:noFill/>
+        </p:spPr>
+        <p:txBody>
+          <a:bodyPr wrap="square" rtlCol="0">
+            <a:spAutoFit/>
+          </a:bodyPr>
+          <a:lstStyle/>
+          <a:p>
+            <a:r>
+              <a:rPr lang="it-IT" b="1" dirty="0">
+                <a:highlight>
+                  <a:srgbClr val="000000"/>
+                </a:highlight>
+                <a:latin typeface="Bahnschrift Light SemiCondensed" panose="020B0502040204020203" pitchFamily="34" charset="0"/>
+              </a:rPr>
+              <a:t>Indirizza alla schermata elimina </a:t>
+            </a:r>
+          </a:p>
+        </p:txBody>
+      </p:sp>
+    </p:spTree>
+    <p:extLst>
+      <p:ext uri="{BB962C8B-B14F-4D97-AF65-F5344CB8AC3E}">
+        <p14:creationId xmlns:p14="http://schemas.microsoft.com/office/powerpoint/2010/main" val="608314140"/>
+      </p:ext>
+    </p:extLst>
+  </p:cSld>
+  <p:clrMapOvr>
+    <a:masterClrMapping/>
+  </p:clrMapOvr>
+  <p:timing>
+    <p:tnLst>
+      <p:par>
+        <p:cTn id="1" dur="indefinite" restart="never" nodeType="tmRoot">
+          <p:childTnLst>
+            <p:seq concurrent="1" nextAc="seek">
+              <p:cTn id="2" dur="indefinite" nodeType="mainSeq">
+                <p:childTnLst>
+                  <p:par>
+                    <p:cTn id="3" fill="hold">
+                      <p:stCondLst>
+                        <p:cond delay="indefinite"/>
+                      </p:stCondLst>
+                      <p:childTnLst>
+                        <p:par>
+                          <p:cTn id="4" fill="hold">
+                            <p:stCondLst>
+                              <p:cond delay="0"/>
+                            </p:stCondLst>
+                            <p:childTnLst>
+                              <p:par>
+                                <p:cTn id="5" presetID="10" presetClass="entr" presetSubtype="0" fill="hold" nodeType="clickEffect">
+                                  <p:stCondLst>
+                                    <p:cond delay="0"/>
+                                  </p:stCondLst>
+                                  <p:childTnLst>
+                                    <p:set>
+                                      <p:cBhvr>
+                                        <p:cTn id="6" dur="1" fill="hold">
+                                          <p:stCondLst>
+                                            <p:cond delay="0"/>
+                                          </p:stCondLst>
+                                        </p:cTn>
+                                        <p:tgtEl>
+                                          <p:spTgt spid="9"/>
+                                        </p:tgtEl>
+                                        <p:attrNameLst>
+                                          <p:attrName>style.visibility</p:attrName>
+                                        </p:attrNameLst>
+                                      </p:cBhvr>
+                                      <p:to>
+                                        <p:strVal val="visible"/>
+                                      </p:to>
+                                    </p:set>
+                                    <p:animEffect transition="in" filter="fade">
+                                      <p:cBhvr>
+                                        <p:cTn id="7" dur="500"/>
+                                        <p:tgtEl>
+                                          <p:spTgt spid="9"/>
+                                        </p:tgtEl>
+                                      </p:cBhvr>
+                                    </p:animEffect>
+                                  </p:childTnLst>
+                                </p:cTn>
+                              </p:par>
+                            </p:childTnLst>
+                          </p:cTn>
+                        </p:par>
+                      </p:childTnLst>
+                    </p:cTn>
+                  </p:par>
+                  <p:par>
+                    <p:cTn id="8" fill="hold">
+                      <p:stCondLst>
+                        <p:cond delay="indefinite"/>
+                      </p:stCondLst>
+                      <p:childTnLst>
+                        <p:par>
+                          <p:cTn id="9" fill="hold">
+                            <p:stCondLst>
+                              <p:cond delay="0"/>
+                            </p:stCondLst>
+                            <p:childTnLst>
+                              <p:par>
+                                <p:cTn id="10" presetID="22" presetClass="entr" presetSubtype="4" fill="hold" nodeType="clickEffect">
+                                  <p:stCondLst>
+                                    <p:cond delay="0"/>
+                                  </p:stCondLst>
+                                  <p:childTnLst>
+                                    <p:set>
+                                      <p:cBhvr>
+                                        <p:cTn id="11" dur="1" fill="hold">
+                                          <p:stCondLst>
+                                            <p:cond delay="0"/>
+                                          </p:stCondLst>
+                                        </p:cTn>
+                                        <p:tgtEl>
+                                          <p:spTgt spid="11"/>
+                                        </p:tgtEl>
+                                        <p:attrNameLst>
+                                          <p:attrName>style.visibility</p:attrName>
+                                        </p:attrNameLst>
+                                      </p:cBhvr>
+                                      <p:to>
+                                        <p:strVal val="visible"/>
+                                      </p:to>
+                                    </p:set>
+                                    <p:animEffect transition="in" filter="wipe(down)">
+                                      <p:cBhvr>
+                                        <p:cTn id="12" dur="500"/>
+                                        <p:tgtEl>
+                                          <p:spTgt spid="11"/>
+                                        </p:tgtEl>
+                                      </p:cBhvr>
+                                    </p:animEffect>
+                                  </p:childTnLst>
+                                </p:cTn>
+                              </p:par>
+                            </p:childTnLst>
+                          </p:cTn>
+                        </p:par>
+                      </p:childTnLst>
+                    </p:cTn>
+                  </p:par>
+                  <p:par>
+                    <p:cTn id="13" fill="hold">
+                      <p:stCondLst>
+                        <p:cond delay="indefinite"/>
+                      </p:stCondLst>
+                      <p:childTnLst>
+                        <p:par>
+                          <p:cTn id="14" fill="hold">
+                            <p:stCondLst>
+                              <p:cond delay="0"/>
+                            </p:stCondLst>
+                            <p:childTnLst>
+                              <p:par>
+                                <p:cTn id="15" presetID="10" presetClass="entr" presetSubtype="0" fill="hold" grpId="0" nodeType="clickEffect">
+                                  <p:stCondLst>
+                                    <p:cond delay="0"/>
+                                  </p:stCondLst>
+                                  <p:childTnLst>
+                                    <p:set>
+                                      <p:cBhvr>
+                                        <p:cTn id="16" dur="1" fill="hold">
+                                          <p:stCondLst>
+                                            <p:cond delay="0"/>
+                                          </p:stCondLst>
+                                        </p:cTn>
+                                        <p:tgtEl>
+                                          <p:spTgt spid="12"/>
+                                        </p:tgtEl>
+                                        <p:attrNameLst>
+                                          <p:attrName>style.visibility</p:attrName>
+                                        </p:attrNameLst>
+                                      </p:cBhvr>
+                                      <p:to>
+                                        <p:strVal val="visible"/>
+                                      </p:to>
+                                    </p:set>
+                                    <p:animEffect transition="in" filter="fade">
+                                      <p:cBhvr>
+                                        <p:cTn id="17" dur="500"/>
+                                        <p:tgtEl>
+                                          <p:spTgt spid="12"/>
+                                        </p:tgtEl>
+                                      </p:cBhvr>
+                                    </p:animEffect>
+                                  </p:childTnLst>
+                                </p:cTn>
+                              </p:par>
+                            </p:childTnLst>
+                          </p:cTn>
+                        </p:par>
+                      </p:childTnLst>
+                    </p:cTn>
+                  </p:par>
+                  <p:par>
+                    <p:cTn id="18" fill="hold">
+                      <p:stCondLst>
+                        <p:cond delay="indefinite"/>
+                      </p:stCondLst>
+                      <p:childTnLst>
+                        <p:par>
+                          <p:cTn id="19" fill="hold">
+                            <p:stCondLst>
+                              <p:cond delay="0"/>
+                            </p:stCondLst>
+                            <p:childTnLst>
+                              <p:par>
+                                <p:cTn id="20" presetID="22" presetClass="entr" presetSubtype="4" fill="hold" nodeType="clickEffect">
+                                  <p:stCondLst>
+                                    <p:cond delay="0"/>
+                                  </p:stCondLst>
+                                  <p:childTnLst>
+                                    <p:set>
+                                      <p:cBhvr>
+                                        <p:cTn id="21" dur="1" fill="hold">
+                                          <p:stCondLst>
+                                            <p:cond delay="0"/>
+                                          </p:stCondLst>
+                                        </p:cTn>
+                                        <p:tgtEl>
+                                          <p:spTgt spid="16"/>
+                                        </p:tgtEl>
+                                        <p:attrNameLst>
+                                          <p:attrName>style.visibility</p:attrName>
+                                        </p:attrNameLst>
+                                      </p:cBhvr>
+                                      <p:to>
+                                        <p:strVal val="visible"/>
+                                      </p:to>
+                                    </p:set>
+                                    <p:animEffect transition="in" filter="wipe(down)">
+                                      <p:cBhvr>
+                                        <p:cTn id="22" dur="500"/>
+                                        <p:tgtEl>
+                                          <p:spTgt spid="16"/>
+                                        </p:tgtEl>
+                                      </p:cBhvr>
+                                    </p:animEffect>
+                                  </p:childTnLst>
+                                </p:cTn>
+                              </p:par>
+                            </p:childTnLst>
+                          </p:cTn>
+                        </p:par>
+                      </p:childTnLst>
+                    </p:cTn>
+                  </p:par>
+                  <p:par>
+                    <p:cTn id="23" fill="hold">
+                      <p:stCondLst>
+                        <p:cond delay="indefinite"/>
+                      </p:stCondLst>
+                      <p:childTnLst>
+                        <p:par>
+                          <p:cTn id="24" fill="hold">
+                            <p:stCondLst>
+                              <p:cond delay="0"/>
+                            </p:stCondLst>
+                            <p:childTnLst>
+                              <p:par>
+                                <p:cTn id="25" presetID="10" presetClass="entr" presetSubtype="0" fill="hold" grpId="0" nodeType="clickEffect">
+                                  <p:stCondLst>
+                                    <p:cond delay="0"/>
+                                  </p:stCondLst>
+                                  <p:childTnLst>
+                                    <p:set>
+                                      <p:cBhvr>
+                                        <p:cTn id="26" dur="1" fill="hold">
+                                          <p:stCondLst>
+                                            <p:cond delay="0"/>
+                                          </p:stCondLst>
+                                        </p:cTn>
+                                        <p:tgtEl>
+                                          <p:spTgt spid="17"/>
+                                        </p:tgtEl>
+                                        <p:attrNameLst>
+                                          <p:attrName>style.visibility</p:attrName>
+                                        </p:attrNameLst>
+                                      </p:cBhvr>
+                                      <p:to>
+                                        <p:strVal val="visible"/>
+                                      </p:to>
+                                    </p:set>
+                                    <p:animEffect transition="in" filter="fade">
+                                      <p:cBhvr>
+                                        <p:cTn id="27" dur="500"/>
+                                        <p:tgtEl>
+                                          <p:spTgt spid="17"/>
+                                        </p:tgtEl>
+                                      </p:cBhvr>
+                                    </p:animEffect>
+                                  </p:childTnLst>
+                                </p:cTn>
+                              </p:par>
+                            </p:childTnLst>
+                          </p:cTn>
+                        </p:par>
+                      </p:childTnLst>
+                    </p:cTn>
+                  </p:par>
+                </p:childTnLst>
+              </p:cTn>
+              <p:prevCondLst>
+                <p:cond evt="onPrev" delay="0">
+                  <p:tgtEl>
+                    <p:sldTgt/>
+                  </p:tgtEl>
+                </p:cond>
+              </p:prevCondLst>
+              <p:nextCondLst>
+                <p:cond evt="onNext" delay="0">
+                  <p:tgtEl>
+                    <p:sldTgt/>
+                  </p:tgtEl>
+                </p:cond>
+              </p:nextCondLst>
+            </p:seq>
+          </p:childTnLst>
+        </p:cTn>
+      </p:par>
+    </p:tnLst>
+    <p:bldLst>
+      <p:bldP spid="12" grpId="0"/>
+      <p:bldP spid="17" grpId="0"/>
+    </p:bldLst>
+  </p:timing>
+</p:sld>
+</file>
+
+<file path=ppt/slides/slide9.xml><?xml version="1.0" encoding="utf-8"?>
+<p:sld xmlns:a="http://schemas.openxmlformats.org/drawingml/2006/main" xmlns:r="http://schemas.openxmlformats.org/officeDocument/2006/relationships" xmlns:p="http://schemas.openxmlformats.org/presentationml/2006/main">
+  <p:cSld>
+    <p:spTree>
+      <p:nvGrpSpPr>
+        <p:cNvPr id="1" name=""/>
+        <p:cNvGrpSpPr/>
+        <p:nvPr/>
+      </p:nvGrpSpPr>
+      <p:grpSpPr>
+        <a:xfrm>
+          <a:off x="0" y="0"/>
+          <a:ext cx="0" cy="0"/>
+          <a:chOff x="0" y="0"/>
+          <a:chExt cx="0" cy="0"/>
+        </a:xfrm>
+      </p:grpSpPr>
+      <p:sp>
+        <p:nvSpPr>
           <p:cNvPr id="4" name="Titolo 1">
             <a:extLst>
               <a:ext uri="{FF2B5EF4-FFF2-40B4-BE49-F238E27FC236}">
@@ -17434,13 +18526,13 @@
         </p:spPr>
         <p:style>
           <a:lnRef idx="2">
-            <a:schemeClr val="dk1"/>
+            <a:schemeClr val="accent2"/>
           </a:lnRef>
           <a:fillRef idx="0">
-            <a:schemeClr val="dk1"/>
+            <a:schemeClr val="accent2"/>
           </a:fillRef>
           <a:effectRef idx="1">
-            <a:schemeClr val="dk1"/>
+            <a:schemeClr val="accent2"/>
           </a:effectRef>
           <a:fontRef idx="minor">
             <a:schemeClr val="tx1"/>
@@ -17473,13 +18565,13 @@
         </p:spPr>
         <p:style>
           <a:lnRef idx="2">
-            <a:schemeClr val="dk1"/>
+            <a:schemeClr val="accent2"/>
           </a:lnRef>
           <a:fillRef idx="0">
-            <a:schemeClr val="dk1"/>
+            <a:schemeClr val="accent2"/>
           </a:fillRef>
           <a:effectRef idx="1">
-            <a:schemeClr val="dk1"/>
+            <a:schemeClr val="accent2"/>
           </a:effectRef>
           <a:fontRef idx="minor">
             <a:schemeClr val="tx1"/>
@@ -17514,13 +18606,13 @@
         </p:spPr>
         <p:style>
           <a:lnRef idx="2">
-            <a:schemeClr val="dk1"/>
+            <a:schemeClr val="accent2"/>
           </a:lnRef>
           <a:fillRef idx="0">
-            <a:schemeClr val="dk1"/>
+            <a:schemeClr val="accent2"/>
           </a:fillRef>
           <a:effectRef idx="1">
-            <a:schemeClr val="dk1"/>
+            <a:schemeClr val="accent2"/>
           </a:effectRef>
           <a:fontRef idx="minor">
             <a:schemeClr val="tx1"/>
@@ -18452,320 +19544,6 @@
 </p:sld>
 </file>
 
-<file path=ppt/slides/slide9.xml><?xml version="1.0" encoding="utf-8"?>
-<p:sld xmlns:a="http://schemas.openxmlformats.org/drawingml/2006/main" xmlns:r="http://schemas.openxmlformats.org/officeDocument/2006/relationships" xmlns:p="http://schemas.openxmlformats.org/presentationml/2006/main">
-  <p:cSld>
-    <p:spTree>
-      <p:nvGrpSpPr>
-        <p:cNvPr id="1" name=""/>
-        <p:cNvGrpSpPr/>
-        <p:nvPr/>
-      </p:nvGrpSpPr>
-      <p:grpSpPr>
-        <a:xfrm>
-          <a:off x="0" y="0"/>
-          <a:ext cx="0" cy="0"/>
-          <a:chOff x="0" y="0"/>
-          <a:chExt cx="0" cy="0"/>
-        </a:xfrm>
-      </p:grpSpPr>
-      <p:sp>
-        <p:nvSpPr>
-          <p:cNvPr id="2" name="Titolo 1">
-            <a:extLst>
-              <a:ext uri="{FF2B5EF4-FFF2-40B4-BE49-F238E27FC236}">
-                <a16:creationId xmlns:a16="http://schemas.microsoft.com/office/drawing/2014/main" id="{0F3339BA-CDBF-4CDA-A1BF-902D7EDE430B}"/>
-              </a:ext>
-            </a:extLst>
-          </p:cNvPr>
-          <p:cNvSpPr>
-            <a:spLocks noGrp="1"/>
-          </p:cNvSpPr>
-          <p:nvPr>
-            <p:ph type="title"/>
-          </p:nvPr>
-        </p:nvSpPr>
-        <p:spPr>
-          <a:xfrm>
-            <a:off x="759030" y="419973"/>
-            <a:ext cx="10673940" cy="1143324"/>
-          </a:xfrm>
-        </p:spPr>
-        <p:txBody>
-          <a:bodyPr>
-            <a:normAutofit/>
-          </a:bodyPr>
-          <a:lstStyle/>
-          <a:p>
-            <a:pPr algn="l"/>
-            <a:r>
-              <a:rPr lang="it-IT" dirty="0"/>
-              <a:t>Registra in magazzino</a:t>
-            </a:r>
-          </a:p>
-        </p:txBody>
-      </p:sp>
-      <p:pic>
-        <p:nvPicPr>
-          <p:cNvPr id="4" name="Immagine 3">
-            <a:extLst>
-              <a:ext uri="{FF2B5EF4-FFF2-40B4-BE49-F238E27FC236}">
-                <a16:creationId xmlns:a16="http://schemas.microsoft.com/office/drawing/2014/main" id="{29E72D38-9AF8-4621-B471-C9C16E9D674C}"/>
-              </a:ext>
-            </a:extLst>
-          </p:cNvPr>
-          <p:cNvPicPr>
-            <a:picLocks noChangeAspect="1"/>
-          </p:cNvPicPr>
-          <p:nvPr/>
-        </p:nvPicPr>
-        <p:blipFill>
-          <a:blip r:embed="rId2"/>
-          <a:stretch>
-            <a:fillRect/>
-          </a:stretch>
-        </p:blipFill>
-        <p:spPr>
-          <a:xfrm>
-            <a:off x="2537012" y="1857375"/>
-            <a:ext cx="6602225" cy="3409600"/>
-          </a:xfrm>
-          <a:prstGeom prst="rect">
-            <a:avLst/>
-          </a:prstGeom>
-        </p:spPr>
-      </p:pic>
-      <p:cxnSp>
-        <p:nvCxnSpPr>
-          <p:cNvPr id="6" name="Connettore 2 5">
-            <a:extLst>
-              <a:ext uri="{FF2B5EF4-FFF2-40B4-BE49-F238E27FC236}">
-                <a16:creationId xmlns:a16="http://schemas.microsoft.com/office/drawing/2014/main" id="{03C31981-B432-48CF-A069-0C4AF1609FD2}"/>
-              </a:ext>
-            </a:extLst>
-          </p:cNvPr>
-          <p:cNvCxnSpPr/>
-          <p:nvPr/>
-        </p:nvCxnSpPr>
-        <p:spPr>
-          <a:xfrm>
-            <a:off x="5773271" y="4285129"/>
-            <a:ext cx="0" cy="349624"/>
-          </a:xfrm>
-          <a:prstGeom prst="straightConnector1">
-            <a:avLst/>
-          </a:prstGeom>
-          <a:ln>
-            <a:tailEnd type="triangle"/>
-          </a:ln>
-        </p:spPr>
-        <p:style>
-          <a:lnRef idx="2">
-            <a:schemeClr val="dk1"/>
-          </a:lnRef>
-          <a:fillRef idx="0">
-            <a:schemeClr val="dk1"/>
-          </a:fillRef>
-          <a:effectRef idx="1">
-            <a:schemeClr val="dk1"/>
-          </a:effectRef>
-          <a:fontRef idx="minor">
-            <a:schemeClr val="tx1"/>
-          </a:fontRef>
-        </p:style>
-      </p:cxnSp>
-      <p:sp>
-        <p:nvSpPr>
-          <p:cNvPr id="7" name="CasellaDiTesto 6">
-            <a:extLst>
-              <a:ext uri="{FF2B5EF4-FFF2-40B4-BE49-F238E27FC236}">
-                <a16:creationId xmlns:a16="http://schemas.microsoft.com/office/drawing/2014/main" id="{AB47FA97-0503-420C-AE83-67E4595E2925}"/>
-              </a:ext>
-            </a:extLst>
-          </p:cNvPr>
-          <p:cNvSpPr txBox="1"/>
-          <p:nvPr/>
-        </p:nvSpPr>
-        <p:spPr>
-          <a:xfrm>
-            <a:off x="4930591" y="4659756"/>
-            <a:ext cx="2079805" cy="923330"/>
-          </a:xfrm>
-          <a:prstGeom prst="rect">
-            <a:avLst/>
-          </a:prstGeom>
-          <a:noFill/>
-        </p:spPr>
-        <p:txBody>
-          <a:bodyPr wrap="square" rtlCol="0">
-            <a:spAutoFit/>
-          </a:bodyPr>
-          <a:lstStyle/>
-          <a:p>
-            <a:r>
-              <a:rPr lang="it-IT" b="1" dirty="0">
-                <a:highlight>
-                  <a:srgbClr val="000000"/>
-                </a:highlight>
-                <a:latin typeface="Bahnschrift Light Condensed" panose="020B0502040204020203" pitchFamily="34" charset="0"/>
-              </a:rPr>
-              <a:t>Il tasto si attiva quando tutti i campi sono compilati </a:t>
-            </a:r>
-          </a:p>
-        </p:txBody>
-      </p:sp>
-    </p:spTree>
-    <p:extLst>
-      <p:ext uri="{BB962C8B-B14F-4D97-AF65-F5344CB8AC3E}">
-        <p14:creationId xmlns:p14="http://schemas.microsoft.com/office/powerpoint/2010/main" val="3819869026"/>
-      </p:ext>
-    </p:extLst>
-  </p:cSld>
-  <p:clrMapOvr>
-    <a:masterClrMapping/>
-  </p:clrMapOvr>
-  <p:timing>
-    <p:tnLst>
-      <p:par>
-        <p:cTn id="1" dur="indefinite" restart="never" nodeType="tmRoot">
-          <p:childTnLst>
-            <p:seq concurrent="1" nextAc="seek">
-              <p:cTn id="2" dur="indefinite" nodeType="mainSeq">
-                <p:childTnLst>
-                  <p:par>
-                    <p:cTn id="3" fill="hold">
-                      <p:stCondLst>
-                        <p:cond delay="indefinite"/>
-                      </p:stCondLst>
-                      <p:childTnLst>
-                        <p:par>
-                          <p:cTn id="4" fill="hold">
-                            <p:stCondLst>
-                              <p:cond delay="0"/>
-                            </p:stCondLst>
-                            <p:childTnLst>
-                              <p:par>
-                                <p:cTn id="5" presetID="22" presetClass="entr" presetSubtype="4" fill="hold" nodeType="clickEffect">
-                                  <p:stCondLst>
-                                    <p:cond delay="0"/>
-                                  </p:stCondLst>
-                                  <p:childTnLst>
-                                    <p:set>
-                                      <p:cBhvr>
-                                        <p:cTn id="6" dur="1" fill="hold">
-                                          <p:stCondLst>
-                                            <p:cond delay="0"/>
-                                          </p:stCondLst>
-                                        </p:cTn>
-                                        <p:tgtEl>
-                                          <p:spTgt spid="6"/>
-                                        </p:tgtEl>
-                                        <p:attrNameLst>
-                                          <p:attrName>style.visibility</p:attrName>
-                                        </p:attrNameLst>
-                                      </p:cBhvr>
-                                      <p:to>
-                                        <p:strVal val="visible"/>
-                                      </p:to>
-                                    </p:set>
-                                    <p:animEffect transition="in" filter="wipe(down)">
-                                      <p:cBhvr>
-                                        <p:cTn id="7" dur="500"/>
-                                        <p:tgtEl>
-                                          <p:spTgt spid="6"/>
-                                        </p:tgtEl>
-                                      </p:cBhvr>
-                                    </p:animEffect>
-                                  </p:childTnLst>
-                                </p:cTn>
-                              </p:par>
-                            </p:childTnLst>
-                          </p:cTn>
-                        </p:par>
-                      </p:childTnLst>
-                    </p:cTn>
-                  </p:par>
-                  <p:par>
-                    <p:cTn id="8" fill="hold">
-                      <p:stCondLst>
-                        <p:cond delay="indefinite"/>
-                      </p:stCondLst>
-                      <p:childTnLst>
-                        <p:par>
-                          <p:cTn id="9" fill="hold">
-                            <p:stCondLst>
-                              <p:cond delay="0"/>
-                            </p:stCondLst>
-                            <p:childTnLst>
-                              <p:par>
-                                <p:cTn id="10" presetID="10" presetClass="entr" presetSubtype="0" fill="hold" grpId="0" nodeType="clickEffect">
-                                  <p:stCondLst>
-                                    <p:cond delay="0"/>
-                                  </p:stCondLst>
-                                  <p:childTnLst>
-                                    <p:set>
-                                      <p:cBhvr>
-                                        <p:cTn id="11" dur="1" fill="hold">
-                                          <p:stCondLst>
-                                            <p:cond delay="0"/>
-                                          </p:stCondLst>
-                                        </p:cTn>
-                                        <p:tgtEl>
-                                          <p:spTgt spid="7"/>
-                                        </p:tgtEl>
-                                        <p:attrNameLst>
-                                          <p:attrName>style.visibility</p:attrName>
-                                        </p:attrNameLst>
-                                      </p:cBhvr>
-                                      <p:to>
-                                        <p:strVal val="visible"/>
-                                      </p:to>
-                                    </p:set>
-                                    <p:animEffect transition="in" filter="fade">
-                                      <p:cBhvr>
-                                        <p:cTn id="12" dur="500"/>
-                                        <p:tgtEl>
-                                          <p:spTgt spid="7"/>
-                                        </p:tgtEl>
-                                      </p:cBhvr>
-                                    </p:animEffect>
-                                  </p:childTnLst>
-                                </p:cTn>
-                              </p:par>
-                            </p:childTnLst>
-                          </p:cTn>
-                        </p:par>
-                      </p:childTnLst>
-                    </p:cTn>
-                  </p:par>
-                </p:childTnLst>
-              </p:cTn>
-              <p:prevCondLst>
-                <p:cond evt="onPrev" delay="0">
-                  <p:tgtEl>
-                    <p:sldTgt/>
-                  </p:tgtEl>
-                </p:cond>
-              </p:prevCondLst>
-              <p:nextCondLst>
-                <p:cond evt="onNext" delay="0">
-                  <p:tgtEl>
-                    <p:sldTgt/>
-                  </p:tgtEl>
-                </p:cond>
-              </p:nextCondLst>
-            </p:seq>
-          </p:childTnLst>
-        </p:cTn>
-      </p:par>
-    </p:tnLst>
-    <p:bldLst>
-      <p:bldP spid="7" grpId="0"/>
-    </p:bldLst>
-  </p:timing>
-</p:sld>
-</file>
-
 <file path=ppt/theme/theme1.xml><?xml version="1.0" encoding="utf-8"?>
 <a:theme xmlns:a="http://schemas.openxmlformats.org/drawingml/2006/main" name="Ritaglio">
   <a:themeElements>

</xml_diff>